<commit_message>
delete samples folder, move samples to docs folder
</commit_message>
<xml_diff>
--- a/docs/humanities-server-workshop.pptx
+++ b/docs/humanities-server-workshop.pptx
@@ -5,7 +5,7 @@
     <p:sldMasterId id="2147483714" r:id="rId1"/>
   </p:sldMasterIdLst>
   <p:notesMasterIdLst>
-    <p:notesMasterId r:id="rId21"/>
+    <p:notesMasterId r:id="rId20"/>
   </p:notesMasterIdLst>
   <p:sldIdLst>
     <p:sldId id="256" r:id="rId2"/>
@@ -16,17 +16,16 @@
     <p:sldId id="264" r:id="rId7"/>
     <p:sldId id="263" r:id="rId8"/>
     <p:sldId id="268" r:id="rId9"/>
-    <p:sldId id="260" r:id="rId10"/>
-    <p:sldId id="261" r:id="rId11"/>
-    <p:sldId id="262" r:id="rId12"/>
-    <p:sldId id="266" r:id="rId13"/>
-    <p:sldId id="267" r:id="rId14"/>
-    <p:sldId id="265" r:id="rId15"/>
-    <p:sldId id="269" r:id="rId16"/>
-    <p:sldId id="270" r:id="rId17"/>
-    <p:sldId id="271" r:id="rId18"/>
-    <p:sldId id="272" r:id="rId19"/>
-    <p:sldId id="273" r:id="rId20"/>
+    <p:sldId id="261" r:id="rId10"/>
+    <p:sldId id="262" r:id="rId11"/>
+    <p:sldId id="266" r:id="rId12"/>
+    <p:sldId id="267" r:id="rId13"/>
+    <p:sldId id="265" r:id="rId14"/>
+    <p:sldId id="269" r:id="rId15"/>
+    <p:sldId id="270" r:id="rId16"/>
+    <p:sldId id="271" r:id="rId17"/>
+    <p:sldId id="272" r:id="rId18"/>
+    <p:sldId id="273" r:id="rId19"/>
   </p:sldIdLst>
   <p:sldSz cx="12192000" cy="6858000"/>
   <p:notesSz cx="6858000" cy="9144000"/>
@@ -215,7 +214,7 @@
           <a:p>
             <a:fld id="{F2888D72-CD00-41C6-B12B-CC9E50E9577B}" type="datetimeFigureOut">
               <a:rPr lang="en-US" smtClean="0"/>
-              <a:t>11/27/18</a:t>
+              <a:t>7/20/21</a:t>
             </a:fld>
             <a:endParaRPr lang="en-US"/>
           </a:p>
@@ -767,7 +766,7 @@
           <a:noFill/>
           <a:extLst>
             <a:ext uri="{909E8E84-426E-40dd-AFC4-6F175D3DCCD1}">
-              <a14:hiddenFill xmlns="" xmlns:a14="http://schemas.microsoft.com/office/drawing/2010/main">
+              <a14:hiddenFill xmlns:a14="http://schemas.microsoft.com/office/drawing/2010/main" xmlns="">
                 <a:solidFill>
                   <a:srgbClr val="FFFFFF"/>
                 </a:solidFill>
@@ -826,7 +825,7 @@
             </a:ln>
             <a:extLst>
               <a:ext uri="{91240B29-F687-4f45-9708-019B960494DF}">
-                <a14:hiddenLine xmlns="" xmlns:a14="http://schemas.microsoft.com/office/drawing/2010/main" w="9525">
+                <a14:hiddenLine xmlns:a14="http://schemas.microsoft.com/office/drawing/2010/main" xmlns="" w="9525">
                   <a:solidFill>
                     <a:srgbClr val="000000"/>
                   </a:solidFill>
@@ -916,7 +915,7 @@
             </a:ln>
             <a:extLst>
               <a:ext uri="{91240B29-F687-4f45-9708-019B960494DF}">
-                <a14:hiddenLine xmlns="" xmlns:a14="http://schemas.microsoft.com/office/drawing/2010/main" w="9525">
+                <a14:hiddenLine xmlns:a14="http://schemas.microsoft.com/office/drawing/2010/main" xmlns="" w="9525">
                   <a:solidFill>
                     <a:srgbClr val="000000"/>
                   </a:solidFill>
@@ -1006,7 +1005,7 @@
             </a:ln>
             <a:extLst>
               <a:ext uri="{91240B29-F687-4f45-9708-019B960494DF}">
-                <a14:hiddenLine xmlns="" xmlns:a14="http://schemas.microsoft.com/office/drawing/2010/main" w="9525">
+                <a14:hiddenLine xmlns:a14="http://schemas.microsoft.com/office/drawing/2010/main" xmlns="" w="9525">
                   <a:solidFill>
                     <a:srgbClr val="000000"/>
                   </a:solidFill>
@@ -1040,7 +1039,7 @@
             </a:ln>
             <a:extLst>
               <a:ext uri="{91240B29-F687-4f45-9708-019B960494DF}">
-                <a14:hiddenLine xmlns="" xmlns:a14="http://schemas.microsoft.com/office/drawing/2010/main" w="9525">
+                <a14:hiddenLine xmlns:a14="http://schemas.microsoft.com/office/drawing/2010/main" xmlns="" w="9525">
                   <a:solidFill>
                     <a:srgbClr val="000000"/>
                   </a:solidFill>
@@ -1130,7 +1129,7 @@
             </a:ln>
             <a:extLst>
               <a:ext uri="{91240B29-F687-4f45-9708-019B960494DF}">
-                <a14:hiddenLine xmlns="" xmlns:a14="http://schemas.microsoft.com/office/drawing/2010/main" w="9525">
+                <a14:hiddenLine xmlns:a14="http://schemas.microsoft.com/office/drawing/2010/main" xmlns="" w="9525">
                   <a:solidFill>
                     <a:srgbClr val="000000"/>
                   </a:solidFill>
@@ -1192,7 +1191,7 @@
             </a:ln>
             <a:extLst>
               <a:ext uri="{91240B29-F687-4f45-9708-019B960494DF}">
-                <a14:hiddenLine xmlns="" xmlns:a14="http://schemas.microsoft.com/office/drawing/2010/main" w="9525">
+                <a14:hiddenLine xmlns:a14="http://schemas.microsoft.com/office/drawing/2010/main" xmlns="" w="9525">
                   <a:solidFill>
                     <a:srgbClr val="000000"/>
                   </a:solidFill>
@@ -1254,7 +1253,7 @@
             </a:ln>
             <a:extLst>
               <a:ext uri="{91240B29-F687-4f45-9708-019B960494DF}">
-                <a14:hiddenLine xmlns="" xmlns:a14="http://schemas.microsoft.com/office/drawing/2010/main" w="9525">
+                <a14:hiddenLine xmlns:a14="http://schemas.microsoft.com/office/drawing/2010/main" xmlns="" w="9525">
                   <a:solidFill>
                     <a:srgbClr val="000000"/>
                   </a:solidFill>
@@ -1344,7 +1343,7 @@
             </a:ln>
             <a:extLst>
               <a:ext uri="{91240B29-F687-4f45-9708-019B960494DF}">
-                <a14:hiddenLine xmlns="" xmlns:a14="http://schemas.microsoft.com/office/drawing/2010/main" w="9525">
+                <a14:hiddenLine xmlns:a14="http://schemas.microsoft.com/office/drawing/2010/main" xmlns="" w="9525">
                   <a:solidFill>
                     <a:srgbClr val="000000"/>
                   </a:solidFill>
@@ -1406,7 +1405,7 @@
             </a:ln>
             <a:extLst>
               <a:ext uri="{91240B29-F687-4f45-9708-019B960494DF}">
-                <a14:hiddenLine xmlns="" xmlns:a14="http://schemas.microsoft.com/office/drawing/2010/main" w="9525">
+                <a14:hiddenLine xmlns:a14="http://schemas.microsoft.com/office/drawing/2010/main" xmlns="" w="9525">
                   <a:solidFill>
                     <a:srgbClr val="000000"/>
                   </a:solidFill>
@@ -1468,7 +1467,7 @@
             </a:ln>
             <a:extLst>
               <a:ext uri="{91240B29-F687-4f45-9708-019B960494DF}">
-                <a14:hiddenLine xmlns="" xmlns:a14="http://schemas.microsoft.com/office/drawing/2010/main" w="9525">
+                <a14:hiddenLine xmlns:a14="http://schemas.microsoft.com/office/drawing/2010/main" xmlns="" w="9525">
                   <a:solidFill>
                     <a:srgbClr val="000000"/>
                   </a:solidFill>
@@ -1558,7 +1557,7 @@
             </a:ln>
             <a:extLst>
               <a:ext uri="{91240B29-F687-4f45-9708-019B960494DF}">
-                <a14:hiddenLine xmlns="" xmlns:a14="http://schemas.microsoft.com/office/drawing/2010/main" w="9525">
+                <a14:hiddenLine xmlns:a14="http://schemas.microsoft.com/office/drawing/2010/main" xmlns="" w="9525">
                   <a:solidFill>
                     <a:srgbClr val="000000"/>
                   </a:solidFill>
@@ -1648,7 +1647,7 @@
             </a:ln>
             <a:extLst>
               <a:ext uri="{91240B29-F687-4f45-9708-019B960494DF}">
-                <a14:hiddenLine xmlns="" xmlns:a14="http://schemas.microsoft.com/office/drawing/2010/main" w="9525">
+                <a14:hiddenLine xmlns:a14="http://schemas.microsoft.com/office/drawing/2010/main" xmlns="" w="9525">
                   <a:solidFill>
                     <a:srgbClr val="000000"/>
                   </a:solidFill>
@@ -1710,7 +1709,7 @@
             </a:ln>
             <a:extLst>
               <a:ext uri="{91240B29-F687-4f45-9708-019B960494DF}">
-                <a14:hiddenLine xmlns="" xmlns:a14="http://schemas.microsoft.com/office/drawing/2010/main" w="9525">
+                <a14:hiddenLine xmlns:a14="http://schemas.microsoft.com/office/drawing/2010/main" xmlns="" w="9525">
                   <a:solidFill>
                     <a:srgbClr val="000000"/>
                   </a:solidFill>
@@ -1820,7 +1819,7 @@
             </a:ln>
             <a:extLst>
               <a:ext uri="{91240B29-F687-4f45-9708-019B960494DF}">
-                <a14:hiddenLine xmlns="" xmlns:a14="http://schemas.microsoft.com/office/drawing/2010/main" w="9525">
+                <a14:hiddenLine xmlns:a14="http://schemas.microsoft.com/office/drawing/2010/main" xmlns="" w="9525">
                   <a:solidFill>
                     <a:srgbClr val="000000"/>
                   </a:solidFill>
@@ -1882,7 +1881,7 @@
             </a:ln>
             <a:extLst>
               <a:ext uri="{91240B29-F687-4f45-9708-019B960494DF}">
-                <a14:hiddenLine xmlns="" xmlns:a14="http://schemas.microsoft.com/office/drawing/2010/main" w="9525">
+                <a14:hiddenLine xmlns:a14="http://schemas.microsoft.com/office/drawing/2010/main" xmlns="" w="9525">
                   <a:solidFill>
                     <a:srgbClr val="000000"/>
                   </a:solidFill>
@@ -1972,7 +1971,7 @@
             </a:ln>
             <a:extLst>
               <a:ext uri="{91240B29-F687-4f45-9708-019B960494DF}">
-                <a14:hiddenLine xmlns="" xmlns:a14="http://schemas.microsoft.com/office/drawing/2010/main" w="9525">
+                <a14:hiddenLine xmlns:a14="http://schemas.microsoft.com/office/drawing/2010/main" xmlns="" w="9525">
                   <a:solidFill>
                     <a:srgbClr val="000000"/>
                   </a:solidFill>
@@ -2062,7 +2061,7 @@
             </a:ln>
             <a:extLst>
               <a:ext uri="{91240B29-F687-4f45-9708-019B960494DF}">
-                <a14:hiddenLine xmlns="" xmlns:a14="http://schemas.microsoft.com/office/drawing/2010/main" w="9525">
+                <a14:hiddenLine xmlns:a14="http://schemas.microsoft.com/office/drawing/2010/main" xmlns="" w="9525">
                   <a:solidFill>
                     <a:srgbClr val="000000"/>
                   </a:solidFill>
@@ -2124,7 +2123,7 @@
             </a:ln>
             <a:extLst>
               <a:ext uri="{91240B29-F687-4f45-9708-019B960494DF}">
-                <a14:hiddenLine xmlns="" xmlns:a14="http://schemas.microsoft.com/office/drawing/2010/main" w="9525">
+                <a14:hiddenLine xmlns:a14="http://schemas.microsoft.com/office/drawing/2010/main" xmlns="" w="9525">
                   <a:solidFill>
                     <a:srgbClr val="000000"/>
                   </a:solidFill>
@@ -2214,7 +2213,7 @@
             </a:ln>
             <a:extLst>
               <a:ext uri="{91240B29-F687-4f45-9708-019B960494DF}">
-                <a14:hiddenLine xmlns="" xmlns:a14="http://schemas.microsoft.com/office/drawing/2010/main" w="9525">
+                <a14:hiddenLine xmlns:a14="http://schemas.microsoft.com/office/drawing/2010/main" xmlns="" w="9525">
                   <a:solidFill>
                     <a:srgbClr val="000000"/>
                   </a:solidFill>
@@ -2304,7 +2303,7 @@
             </a:ln>
             <a:extLst>
               <a:ext uri="{91240B29-F687-4f45-9708-019B960494DF}">
-                <a14:hiddenLine xmlns="" xmlns:a14="http://schemas.microsoft.com/office/drawing/2010/main" w="9525">
+                <a14:hiddenLine xmlns:a14="http://schemas.microsoft.com/office/drawing/2010/main" xmlns="" w="9525">
                   <a:solidFill>
                     <a:srgbClr val="000000"/>
                   </a:solidFill>
@@ -2360,7 +2359,7 @@
             </a:ln>
             <a:extLst>
               <a:ext uri="{91240B29-F687-4f45-9708-019B960494DF}">
-                <a14:hiddenLine xmlns="" xmlns:a14="http://schemas.microsoft.com/office/drawing/2010/main" w="9525">
+                <a14:hiddenLine xmlns:a14="http://schemas.microsoft.com/office/drawing/2010/main" xmlns="" w="9525">
                   <a:solidFill>
                     <a:srgbClr val="000000"/>
                   </a:solidFill>
@@ -2450,7 +2449,7 @@
             </a:ln>
             <a:extLst>
               <a:ext uri="{91240B29-F687-4f45-9708-019B960494DF}">
-                <a14:hiddenLine xmlns="" xmlns:a14="http://schemas.microsoft.com/office/drawing/2010/main" w="9525">
+                <a14:hiddenLine xmlns:a14="http://schemas.microsoft.com/office/drawing/2010/main" xmlns="" w="9525">
                   <a:solidFill>
                     <a:srgbClr val="000000"/>
                   </a:solidFill>
@@ -2506,7 +2505,7 @@
             </a:ln>
             <a:extLst>
               <a:ext uri="{91240B29-F687-4f45-9708-019B960494DF}">
-                <a14:hiddenLine xmlns="" xmlns:a14="http://schemas.microsoft.com/office/drawing/2010/main" w="9525">
+                <a14:hiddenLine xmlns:a14="http://schemas.microsoft.com/office/drawing/2010/main" xmlns="" w="9525">
                   <a:solidFill>
                     <a:srgbClr val="000000"/>
                   </a:solidFill>
@@ -2596,7 +2595,7 @@
             </a:ln>
             <a:extLst>
               <a:ext uri="{91240B29-F687-4f45-9708-019B960494DF}">
-                <a14:hiddenLine xmlns="" xmlns:a14="http://schemas.microsoft.com/office/drawing/2010/main" w="9525">
+                <a14:hiddenLine xmlns:a14="http://schemas.microsoft.com/office/drawing/2010/main" xmlns="" w="9525">
                   <a:solidFill>
                     <a:srgbClr val="000000"/>
                   </a:solidFill>
@@ -2664,7 +2663,7 @@
             </a:ln>
             <a:extLst>
               <a:ext uri="{91240B29-F687-4f45-9708-019B960494DF}">
-                <a14:hiddenLine xmlns="" xmlns:a14="http://schemas.microsoft.com/office/drawing/2010/main" w="9525">
+                <a14:hiddenLine xmlns:a14="http://schemas.microsoft.com/office/drawing/2010/main" xmlns="" w="9525">
                   <a:solidFill>
                     <a:srgbClr val="000000"/>
                   </a:solidFill>
@@ -2754,7 +2753,7 @@
             </a:ln>
             <a:extLst>
               <a:ext uri="{91240B29-F687-4f45-9708-019B960494DF}">
-                <a14:hiddenLine xmlns="" xmlns:a14="http://schemas.microsoft.com/office/drawing/2010/main" w="9525">
+                <a14:hiddenLine xmlns:a14="http://schemas.microsoft.com/office/drawing/2010/main" xmlns="" w="9525">
                   <a:solidFill>
                     <a:srgbClr val="000000"/>
                   </a:solidFill>
@@ -2822,7 +2821,7 @@
             </a:ln>
             <a:extLst>
               <a:ext uri="{91240B29-F687-4f45-9708-019B960494DF}">
-                <a14:hiddenLine xmlns="" xmlns:a14="http://schemas.microsoft.com/office/drawing/2010/main" w="9525">
+                <a14:hiddenLine xmlns:a14="http://schemas.microsoft.com/office/drawing/2010/main" xmlns="" w="9525">
                   <a:solidFill>
                     <a:srgbClr val="000000"/>
                   </a:solidFill>
@@ -2912,7 +2911,7 @@
             </a:ln>
             <a:extLst>
               <a:ext uri="{91240B29-F687-4f45-9708-019B960494DF}">
-                <a14:hiddenLine xmlns="" xmlns:a14="http://schemas.microsoft.com/office/drawing/2010/main" w="9525">
+                <a14:hiddenLine xmlns:a14="http://schemas.microsoft.com/office/drawing/2010/main" xmlns="" w="9525">
                   <a:solidFill>
                     <a:srgbClr val="000000"/>
                   </a:solidFill>
@@ -2946,7 +2945,7 @@
             </a:ln>
             <a:extLst>
               <a:ext uri="{91240B29-F687-4f45-9708-019B960494DF}">
-                <a14:hiddenLine xmlns="" xmlns:a14="http://schemas.microsoft.com/office/drawing/2010/main" w="9525">
+                <a14:hiddenLine xmlns:a14="http://schemas.microsoft.com/office/drawing/2010/main" xmlns="" w="9525">
                   <a:solidFill>
                     <a:srgbClr val="000000"/>
                   </a:solidFill>
@@ -3036,7 +3035,7 @@
             </a:ln>
             <a:extLst>
               <a:ext uri="{91240B29-F687-4f45-9708-019B960494DF}">
-                <a14:hiddenLine xmlns="" xmlns:a14="http://schemas.microsoft.com/office/drawing/2010/main" w="9525">
+                <a14:hiddenLine xmlns:a14="http://schemas.microsoft.com/office/drawing/2010/main" xmlns="" w="9525">
                   <a:solidFill>
                     <a:srgbClr val="000000"/>
                   </a:solidFill>
@@ -3098,7 +3097,7 @@
             </a:ln>
             <a:extLst>
               <a:ext uri="{91240B29-F687-4f45-9708-019B960494DF}">
-                <a14:hiddenLine xmlns="" xmlns:a14="http://schemas.microsoft.com/office/drawing/2010/main" w="9525">
+                <a14:hiddenLine xmlns:a14="http://schemas.microsoft.com/office/drawing/2010/main" xmlns="" w="9525">
                   <a:solidFill>
                     <a:srgbClr val="000000"/>
                   </a:solidFill>
@@ -3160,7 +3159,7 @@
             </a:ln>
             <a:extLst>
               <a:ext uri="{91240B29-F687-4f45-9708-019B960494DF}">
-                <a14:hiddenLine xmlns="" xmlns:a14="http://schemas.microsoft.com/office/drawing/2010/main" w="9525">
+                <a14:hiddenLine xmlns:a14="http://schemas.microsoft.com/office/drawing/2010/main" xmlns="" w="9525">
                   <a:solidFill>
                     <a:srgbClr val="000000"/>
                   </a:solidFill>
@@ -3250,7 +3249,7 @@
             </a:ln>
             <a:extLst>
               <a:ext uri="{91240B29-F687-4f45-9708-019B960494DF}">
-                <a14:hiddenLine xmlns="" xmlns:a14="http://schemas.microsoft.com/office/drawing/2010/main" w="9525">
+                <a14:hiddenLine xmlns:a14="http://schemas.microsoft.com/office/drawing/2010/main" xmlns="" w="9525">
                   <a:solidFill>
                     <a:srgbClr val="000000"/>
                   </a:solidFill>
@@ -3318,7 +3317,7 @@
             </a:ln>
             <a:extLst>
               <a:ext uri="{91240B29-F687-4f45-9708-019B960494DF}">
-                <a14:hiddenLine xmlns="" xmlns:a14="http://schemas.microsoft.com/office/drawing/2010/main" w="9525">
+                <a14:hiddenLine xmlns:a14="http://schemas.microsoft.com/office/drawing/2010/main" xmlns="" w="9525">
                   <a:solidFill>
                     <a:srgbClr val="000000"/>
                   </a:solidFill>
@@ -3380,7 +3379,7 @@
             </a:ln>
             <a:extLst>
               <a:ext uri="{91240B29-F687-4f45-9708-019B960494DF}">
-                <a14:hiddenLine xmlns="" xmlns:a14="http://schemas.microsoft.com/office/drawing/2010/main" w="9525">
+                <a14:hiddenLine xmlns:a14="http://schemas.microsoft.com/office/drawing/2010/main" xmlns="" w="9525">
                   <a:solidFill>
                     <a:srgbClr val="000000"/>
                   </a:solidFill>
@@ -3470,7 +3469,7 @@
             </a:ln>
             <a:extLst>
               <a:ext uri="{91240B29-F687-4f45-9708-019B960494DF}">
-                <a14:hiddenLine xmlns="" xmlns:a14="http://schemas.microsoft.com/office/drawing/2010/main" w="9525">
+                <a14:hiddenLine xmlns:a14="http://schemas.microsoft.com/office/drawing/2010/main" xmlns="" w="9525">
                   <a:solidFill>
                     <a:srgbClr val="000000"/>
                   </a:solidFill>
@@ -3532,7 +3531,7 @@
             </a:ln>
             <a:extLst>
               <a:ext uri="{91240B29-F687-4f45-9708-019B960494DF}">
-                <a14:hiddenLine xmlns="" xmlns:a14="http://schemas.microsoft.com/office/drawing/2010/main" w="9525">
+                <a14:hiddenLine xmlns:a14="http://schemas.microsoft.com/office/drawing/2010/main" xmlns="" w="9525">
                   <a:solidFill>
                     <a:srgbClr val="000000"/>
                   </a:solidFill>
@@ -3622,7 +3621,7 @@
             </a:ln>
             <a:extLst>
               <a:ext uri="{91240B29-F687-4f45-9708-019B960494DF}">
-                <a14:hiddenLine xmlns="" xmlns:a14="http://schemas.microsoft.com/office/drawing/2010/main" w="9525">
+                <a14:hiddenLine xmlns:a14="http://schemas.microsoft.com/office/drawing/2010/main" xmlns="" w="9525">
                   <a:solidFill>
                     <a:srgbClr val="000000"/>
                   </a:solidFill>
@@ -3684,7 +3683,7 @@
             </a:ln>
             <a:extLst>
               <a:ext uri="{91240B29-F687-4f45-9708-019B960494DF}">
-                <a14:hiddenLine xmlns="" xmlns:a14="http://schemas.microsoft.com/office/drawing/2010/main" w="9525">
+                <a14:hiddenLine xmlns:a14="http://schemas.microsoft.com/office/drawing/2010/main" xmlns="" w="9525">
                   <a:solidFill>
                     <a:srgbClr val="000000"/>
                   </a:solidFill>
@@ -3774,7 +3773,7 @@
             </a:ln>
             <a:extLst>
               <a:ext uri="{91240B29-F687-4f45-9708-019B960494DF}">
-                <a14:hiddenLine xmlns="" xmlns:a14="http://schemas.microsoft.com/office/drawing/2010/main" w="9525">
+                <a14:hiddenLine xmlns:a14="http://schemas.microsoft.com/office/drawing/2010/main" xmlns="" w="9525">
                   <a:solidFill>
                     <a:srgbClr val="000000"/>
                   </a:solidFill>
@@ -3808,7 +3807,7 @@
             </a:ln>
             <a:extLst>
               <a:ext uri="{91240B29-F687-4f45-9708-019B960494DF}">
-                <a14:hiddenLine xmlns="" xmlns:a14="http://schemas.microsoft.com/office/drawing/2010/main" w="9525">
+                <a14:hiddenLine xmlns:a14="http://schemas.microsoft.com/office/drawing/2010/main" xmlns="" w="9525">
                   <a:solidFill>
                     <a:srgbClr val="000000"/>
                   </a:solidFill>
@@ -3873,7 +3872,7 @@
             </a:ln>
             <a:extLst>
               <a:ext uri="{91240B29-F687-4f45-9708-019B960494DF}">
-                <a14:hiddenLine xmlns="" xmlns:a14="http://schemas.microsoft.com/office/drawing/2010/main" w="9525">
+                <a14:hiddenLine xmlns:a14="http://schemas.microsoft.com/office/drawing/2010/main" xmlns="" w="9525">
                   <a:solidFill>
                     <a:srgbClr val="000000"/>
                   </a:solidFill>
@@ -3963,7 +3962,7 @@
             </a:ln>
             <a:extLst>
               <a:ext uri="{91240B29-F687-4f45-9708-019B960494DF}">
-                <a14:hiddenLine xmlns="" xmlns:a14="http://schemas.microsoft.com/office/drawing/2010/main" w="9525">
+                <a14:hiddenLine xmlns:a14="http://schemas.microsoft.com/office/drawing/2010/main" xmlns="" w="9525">
                   <a:solidFill>
                     <a:srgbClr val="000000"/>
                   </a:solidFill>
@@ -4025,7 +4024,7 @@
             </a:ln>
             <a:extLst>
               <a:ext uri="{91240B29-F687-4f45-9708-019B960494DF}">
-                <a14:hiddenLine xmlns="" xmlns:a14="http://schemas.microsoft.com/office/drawing/2010/main" w="9525">
+                <a14:hiddenLine xmlns:a14="http://schemas.microsoft.com/office/drawing/2010/main" xmlns="" w="9525">
                   <a:solidFill>
                     <a:srgbClr val="000000"/>
                   </a:solidFill>
@@ -4115,7 +4114,7 @@
             </a:ln>
             <a:extLst>
               <a:ext uri="{91240B29-F687-4f45-9708-019B960494DF}">
-                <a14:hiddenLine xmlns="" xmlns:a14="http://schemas.microsoft.com/office/drawing/2010/main" w="9525">
+                <a14:hiddenLine xmlns:a14="http://schemas.microsoft.com/office/drawing/2010/main" xmlns="" w="9525">
                   <a:solidFill>
                     <a:srgbClr val="000000"/>
                   </a:solidFill>
@@ -4205,7 +4204,7 @@
             </a:ln>
             <a:extLst>
               <a:ext uri="{91240B29-F687-4f45-9708-019B960494DF}">
-                <a14:hiddenLine xmlns="" xmlns:a14="http://schemas.microsoft.com/office/drawing/2010/main" w="9525">
+                <a14:hiddenLine xmlns:a14="http://schemas.microsoft.com/office/drawing/2010/main" xmlns="" w="9525">
                   <a:solidFill>
                     <a:srgbClr val="000000"/>
                   </a:solidFill>
@@ -4270,7 +4269,7 @@
             </a:ln>
             <a:extLst>
               <a:ext uri="{91240B29-F687-4f45-9708-019B960494DF}">
-                <a14:hiddenLine xmlns="" xmlns:a14="http://schemas.microsoft.com/office/drawing/2010/main" w="9525">
+                <a14:hiddenLine xmlns:a14="http://schemas.microsoft.com/office/drawing/2010/main" xmlns="" w="9525">
                   <a:solidFill>
                     <a:srgbClr val="000000"/>
                   </a:solidFill>
@@ -4332,7 +4331,7 @@
             </a:ln>
             <a:extLst>
               <a:ext uri="{91240B29-F687-4f45-9708-019B960494DF}">
-                <a14:hiddenLine xmlns="" xmlns:a14="http://schemas.microsoft.com/office/drawing/2010/main" w="9525">
+                <a14:hiddenLine xmlns:a14="http://schemas.microsoft.com/office/drawing/2010/main" xmlns="" w="9525">
                   <a:solidFill>
                     <a:srgbClr val="000000"/>
                   </a:solidFill>
@@ -4422,7 +4421,7 @@
             </a:ln>
             <a:extLst>
               <a:ext uri="{91240B29-F687-4f45-9708-019B960494DF}">
-                <a14:hiddenLine xmlns="" xmlns:a14="http://schemas.microsoft.com/office/drawing/2010/main" w="9525">
+                <a14:hiddenLine xmlns:a14="http://schemas.microsoft.com/office/drawing/2010/main" xmlns="" w="9525">
                   <a:solidFill>
                     <a:srgbClr val="000000"/>
                   </a:solidFill>
@@ -4512,7 +4511,7 @@
             </a:ln>
             <a:extLst>
               <a:ext uri="{91240B29-F687-4f45-9708-019B960494DF}">
-                <a14:hiddenLine xmlns="" xmlns:a14="http://schemas.microsoft.com/office/drawing/2010/main" w="9525">
+                <a14:hiddenLine xmlns:a14="http://schemas.microsoft.com/office/drawing/2010/main" xmlns="" w="9525">
                   <a:solidFill>
                     <a:srgbClr val="000000"/>
                   </a:solidFill>
@@ -4574,7 +4573,7 @@
             </a:ln>
             <a:extLst>
               <a:ext uri="{91240B29-F687-4f45-9708-019B960494DF}">
-                <a14:hiddenLine xmlns="" xmlns:a14="http://schemas.microsoft.com/office/drawing/2010/main" w="9525">
+                <a14:hiddenLine xmlns:a14="http://schemas.microsoft.com/office/drawing/2010/main" xmlns="" w="9525">
                   <a:solidFill>
                     <a:srgbClr val="000000"/>
                   </a:solidFill>
@@ -4694,7 +4693,7 @@
             </a:ln>
             <a:extLst>
               <a:ext uri="{91240B29-F687-4f45-9708-019B960494DF}">
-                <a14:hiddenLine xmlns="" xmlns:a14="http://schemas.microsoft.com/office/drawing/2010/main" w="9525">
+                <a14:hiddenLine xmlns:a14="http://schemas.microsoft.com/office/drawing/2010/main" xmlns="" w="9525">
                   <a:solidFill>
                     <a:srgbClr val="000000"/>
                   </a:solidFill>
@@ -4762,7 +4761,7 @@
             </a:ln>
             <a:extLst>
               <a:ext uri="{91240B29-F687-4f45-9708-019B960494DF}">
-                <a14:hiddenLine xmlns="" xmlns:a14="http://schemas.microsoft.com/office/drawing/2010/main" w="9525">
+                <a14:hiddenLine xmlns:a14="http://schemas.microsoft.com/office/drawing/2010/main" xmlns="" w="9525">
                   <a:solidFill>
                     <a:srgbClr val="000000"/>
                   </a:solidFill>
@@ -4852,7 +4851,7 @@
             </a:ln>
             <a:extLst>
               <a:ext uri="{91240B29-F687-4f45-9708-019B960494DF}">
-                <a14:hiddenLine xmlns="" xmlns:a14="http://schemas.microsoft.com/office/drawing/2010/main" w="9525">
+                <a14:hiddenLine xmlns:a14="http://schemas.microsoft.com/office/drawing/2010/main" xmlns="" w="9525">
                   <a:solidFill>
                     <a:srgbClr val="000000"/>
                   </a:solidFill>
@@ -4992,7 +4991,7 @@
           <a:p>
             <a:fld id="{62B29A1C-2C6F-4F53-8817-88025C8CDCD8}" type="datetimeFigureOut">
               <a:rPr lang="en-US" smtClean="0"/>
-              <a:t>11/27/18</a:t>
+              <a:t>7/20/21</a:t>
             </a:fld>
             <a:endParaRPr lang="en-US"/>
           </a:p>
@@ -5259,7 +5258,7 @@
           <a:p>
             <a:fld id="{62B29A1C-2C6F-4F53-8817-88025C8CDCD8}" type="datetimeFigureOut">
               <a:rPr lang="en-US" smtClean="0"/>
-              <a:t>11/27/18</a:t>
+              <a:t>7/20/21</a:t>
             </a:fld>
             <a:endParaRPr lang="en-US"/>
           </a:p>
@@ -5455,7 +5454,7 @@
           <a:p>
             <a:fld id="{62B29A1C-2C6F-4F53-8817-88025C8CDCD8}" type="datetimeFigureOut">
               <a:rPr lang="en-US" smtClean="0"/>
-              <a:t>11/27/18</a:t>
+              <a:t>7/20/21</a:t>
             </a:fld>
             <a:endParaRPr lang="en-US"/>
           </a:p>
@@ -5718,7 +5717,7 @@
           <a:p>
             <a:fld id="{62B29A1C-2C6F-4F53-8817-88025C8CDCD8}" type="datetimeFigureOut">
               <a:rPr lang="en-US" smtClean="0"/>
-              <a:t>11/27/18</a:t>
+              <a:t>7/20/21</a:t>
             </a:fld>
             <a:endParaRPr lang="en-US"/>
           </a:p>
@@ -6152,7 +6151,7 @@
           <a:p>
             <a:fld id="{62B29A1C-2C6F-4F53-8817-88025C8CDCD8}" type="datetimeFigureOut">
               <a:rPr lang="en-US" smtClean="0"/>
-              <a:t>11/27/18</a:t>
+              <a:t>7/20/21</a:t>
             </a:fld>
             <a:endParaRPr lang="en-US"/>
           </a:p>
@@ -6698,7 +6697,7 @@
           <a:p>
             <a:fld id="{62B29A1C-2C6F-4F53-8817-88025C8CDCD8}" type="datetimeFigureOut">
               <a:rPr lang="en-US" smtClean="0"/>
-              <a:t>11/27/18</a:t>
+              <a:t>7/20/21</a:t>
             </a:fld>
             <a:endParaRPr lang="en-US"/>
           </a:p>
@@ -7418,7 +7417,7 @@
           <a:p>
             <a:fld id="{62B29A1C-2C6F-4F53-8817-88025C8CDCD8}" type="datetimeFigureOut">
               <a:rPr lang="en-US" smtClean="0"/>
-              <a:t>11/27/18</a:t>
+              <a:t>7/20/21</a:t>
             </a:fld>
             <a:endParaRPr lang="en-US"/>
           </a:p>
@@ -7588,7 +7587,7 @@
           <a:p>
             <a:fld id="{62B29A1C-2C6F-4F53-8817-88025C8CDCD8}" type="datetimeFigureOut">
               <a:rPr lang="en-US" smtClean="0"/>
-              <a:t>11/27/18</a:t>
+              <a:t>7/20/21</a:t>
             </a:fld>
             <a:endParaRPr lang="en-US"/>
           </a:p>
@@ -7768,7 +7767,7 @@
           <a:p>
             <a:fld id="{62B29A1C-2C6F-4F53-8817-88025C8CDCD8}" type="datetimeFigureOut">
               <a:rPr lang="en-US" smtClean="0"/>
-              <a:t>11/27/18</a:t>
+              <a:t>7/20/21</a:t>
             </a:fld>
             <a:endParaRPr lang="en-US"/>
           </a:p>
@@ -7938,7 +7937,7 @@
           <a:p>
             <a:fld id="{62B29A1C-2C6F-4F53-8817-88025C8CDCD8}" type="datetimeFigureOut">
               <a:rPr lang="en-US" smtClean="0"/>
-              <a:t>11/27/18</a:t>
+              <a:t>7/20/21</a:t>
             </a:fld>
             <a:endParaRPr lang="en-US"/>
           </a:p>
@@ -8188,7 +8187,7 @@
           <a:p>
             <a:fld id="{62B29A1C-2C6F-4F53-8817-88025C8CDCD8}" type="datetimeFigureOut">
               <a:rPr lang="en-US" smtClean="0"/>
-              <a:t>11/27/18</a:t>
+              <a:t>7/20/21</a:t>
             </a:fld>
             <a:endParaRPr lang="en-US"/>
           </a:p>
@@ -8420,7 +8419,7 @@
           <a:p>
             <a:fld id="{62B29A1C-2C6F-4F53-8817-88025C8CDCD8}" type="datetimeFigureOut">
               <a:rPr lang="en-US" smtClean="0"/>
-              <a:t>11/27/18</a:t>
+              <a:t>7/20/21</a:t>
             </a:fld>
             <a:endParaRPr lang="en-US"/>
           </a:p>
@@ -8801,7 +8800,7 @@
           <a:p>
             <a:fld id="{62B29A1C-2C6F-4F53-8817-88025C8CDCD8}" type="datetimeFigureOut">
               <a:rPr lang="en-US" smtClean="0"/>
-              <a:t>11/27/18</a:t>
+              <a:t>7/20/21</a:t>
             </a:fld>
             <a:endParaRPr lang="en-US"/>
           </a:p>
@@ -8919,7 +8918,7 @@
           <a:p>
             <a:fld id="{62B29A1C-2C6F-4F53-8817-88025C8CDCD8}" type="datetimeFigureOut">
               <a:rPr lang="en-US" smtClean="0"/>
-              <a:t>11/27/18</a:t>
+              <a:t>7/20/21</a:t>
             </a:fld>
             <a:endParaRPr lang="en-US"/>
           </a:p>
@@ -9014,7 +9013,7 @@
           <a:p>
             <a:fld id="{62B29A1C-2C6F-4F53-8817-88025C8CDCD8}" type="datetimeFigureOut">
               <a:rPr lang="en-US" smtClean="0"/>
-              <a:t>11/27/18</a:t>
+              <a:t>7/20/21</a:t>
             </a:fld>
             <a:endParaRPr lang="en-US"/>
           </a:p>
@@ -9263,7 +9262,7 @@
           <a:p>
             <a:fld id="{62B29A1C-2C6F-4F53-8817-88025C8CDCD8}" type="datetimeFigureOut">
               <a:rPr lang="en-US" smtClean="0"/>
-              <a:t>11/27/18</a:t>
+              <a:t>7/20/21</a:t>
             </a:fld>
             <a:endParaRPr lang="en-US"/>
           </a:p>
@@ -9543,7 +9542,7 @@
           <a:p>
             <a:fld id="{62B29A1C-2C6F-4F53-8817-88025C8CDCD8}" type="datetimeFigureOut">
               <a:rPr lang="en-US" smtClean="0"/>
-              <a:t>11/27/18</a:t>
+              <a:t>7/20/21</a:t>
             </a:fld>
             <a:endParaRPr lang="en-US"/>
           </a:p>
@@ -9666,7 +9665,7 @@
           <a:noFill/>
           <a:extLst>
             <a:ext uri="{909E8E84-426E-40dd-AFC4-6F175D3DCCD1}">
-              <a14:hiddenFill xmlns="" xmlns:a14="http://schemas.microsoft.com/office/drawing/2010/main">
+              <a14:hiddenFill xmlns:a14="http://schemas.microsoft.com/office/drawing/2010/main" xmlns="">
                 <a:solidFill>
                   <a:srgbClr val="FFFFFF"/>
                 </a:solidFill>
@@ -9740,7 +9739,7 @@
               </a:ln>
               <a:extLst>
                 <a:ext uri="{91240B29-F687-4f45-9708-019B960494DF}">
-                  <a14:hiddenLine xmlns="" xmlns:a14="http://schemas.microsoft.com/office/drawing/2010/main" w="9525">
+                  <a14:hiddenLine xmlns:a14="http://schemas.microsoft.com/office/drawing/2010/main" xmlns="" w="9525">
                     <a:solidFill>
                       <a:srgbClr val="000000"/>
                     </a:solidFill>
@@ -9830,7 +9829,7 @@
               </a:ln>
               <a:extLst>
                 <a:ext uri="{91240B29-F687-4f45-9708-019B960494DF}">
-                  <a14:hiddenLine xmlns="" xmlns:a14="http://schemas.microsoft.com/office/drawing/2010/main" w="9525">
+                  <a14:hiddenLine xmlns:a14="http://schemas.microsoft.com/office/drawing/2010/main" xmlns="" w="9525">
                     <a:solidFill>
                       <a:srgbClr val="000000"/>
                     </a:solidFill>
@@ -9920,7 +9919,7 @@
               </a:ln>
               <a:extLst>
                 <a:ext uri="{91240B29-F687-4f45-9708-019B960494DF}">
-                  <a14:hiddenLine xmlns="" xmlns:a14="http://schemas.microsoft.com/office/drawing/2010/main" w="9525">
+                  <a14:hiddenLine xmlns:a14="http://schemas.microsoft.com/office/drawing/2010/main" xmlns="" w="9525">
                     <a:solidFill>
                       <a:srgbClr val="000000"/>
                     </a:solidFill>
@@ -9982,7 +9981,7 @@
               </a:ln>
               <a:extLst>
                 <a:ext uri="{91240B29-F687-4f45-9708-019B960494DF}">
-                  <a14:hiddenLine xmlns="" xmlns:a14="http://schemas.microsoft.com/office/drawing/2010/main" w="9525">
+                  <a14:hiddenLine xmlns:a14="http://schemas.microsoft.com/office/drawing/2010/main" xmlns="" w="9525">
                     <a:solidFill>
                       <a:srgbClr val="000000"/>
                     </a:solidFill>
@@ -10072,7 +10071,7 @@
               </a:ln>
               <a:extLst>
                 <a:ext uri="{91240B29-F687-4f45-9708-019B960494DF}">
-                  <a14:hiddenLine xmlns="" xmlns:a14="http://schemas.microsoft.com/office/drawing/2010/main" w="9525">
+                  <a14:hiddenLine xmlns:a14="http://schemas.microsoft.com/office/drawing/2010/main" xmlns="" w="9525">
                     <a:solidFill>
                       <a:srgbClr val="000000"/>
                     </a:solidFill>
@@ -10134,7 +10133,7 @@
               </a:ln>
               <a:extLst>
                 <a:ext uri="{91240B29-F687-4f45-9708-019B960494DF}">
-                  <a14:hiddenLine xmlns="" xmlns:a14="http://schemas.microsoft.com/office/drawing/2010/main" w="9525">
+                  <a14:hiddenLine xmlns:a14="http://schemas.microsoft.com/office/drawing/2010/main" xmlns="" w="9525">
                     <a:solidFill>
                       <a:srgbClr val="000000"/>
                     </a:solidFill>
@@ -10196,7 +10195,7 @@
               </a:ln>
               <a:extLst>
                 <a:ext uri="{91240B29-F687-4f45-9708-019B960494DF}">
-                  <a14:hiddenLine xmlns="" xmlns:a14="http://schemas.microsoft.com/office/drawing/2010/main" w="9525">
+                  <a14:hiddenLine xmlns:a14="http://schemas.microsoft.com/office/drawing/2010/main" xmlns="" w="9525">
                     <a:solidFill>
                       <a:srgbClr val="000000"/>
                     </a:solidFill>
@@ -10286,7 +10285,7 @@
               </a:ln>
               <a:extLst>
                 <a:ext uri="{91240B29-F687-4f45-9708-019B960494DF}">
-                  <a14:hiddenLine xmlns="" xmlns:a14="http://schemas.microsoft.com/office/drawing/2010/main" w="9525">
+                  <a14:hiddenLine xmlns:a14="http://schemas.microsoft.com/office/drawing/2010/main" xmlns="" w="9525">
                     <a:solidFill>
                       <a:srgbClr val="000000"/>
                     </a:solidFill>
@@ -10376,7 +10375,7 @@
               </a:ln>
               <a:extLst>
                 <a:ext uri="{91240B29-F687-4f45-9708-019B960494DF}">
-                  <a14:hiddenLine xmlns="" xmlns:a14="http://schemas.microsoft.com/office/drawing/2010/main" w="9525">
+                  <a14:hiddenLine xmlns:a14="http://schemas.microsoft.com/office/drawing/2010/main" xmlns="" w="9525">
                     <a:solidFill>
                       <a:srgbClr val="000000"/>
                     </a:solidFill>
@@ -10438,7 +10437,7 @@
               </a:ln>
               <a:extLst>
                 <a:ext uri="{91240B29-F687-4f45-9708-019B960494DF}">
-                  <a14:hiddenLine xmlns="" xmlns:a14="http://schemas.microsoft.com/office/drawing/2010/main" w="9525">
+                  <a14:hiddenLine xmlns:a14="http://schemas.microsoft.com/office/drawing/2010/main" xmlns="" w="9525">
                     <a:solidFill>
                       <a:srgbClr val="000000"/>
                     </a:solidFill>
@@ -10548,7 +10547,7 @@
               </a:ln>
               <a:extLst>
                 <a:ext uri="{91240B29-F687-4f45-9708-019B960494DF}">
-                  <a14:hiddenLine xmlns="" xmlns:a14="http://schemas.microsoft.com/office/drawing/2010/main" w="9525">
+                  <a14:hiddenLine xmlns:a14="http://schemas.microsoft.com/office/drawing/2010/main" xmlns="" w="9525">
                     <a:solidFill>
                       <a:srgbClr val="000000"/>
                     </a:solidFill>
@@ -10632,7 +10631,7 @@
               </a:ln>
               <a:extLst>
                 <a:ext uri="{91240B29-F687-4f45-9708-019B960494DF}">
-                  <a14:hiddenLine xmlns="" xmlns:a14="http://schemas.microsoft.com/office/drawing/2010/main" w="9525">
+                  <a14:hiddenLine xmlns:a14="http://schemas.microsoft.com/office/drawing/2010/main" xmlns="" w="9525">
                     <a:solidFill>
                       <a:srgbClr val="000000"/>
                     </a:solidFill>
@@ -10694,7 +10693,7 @@
               </a:ln>
               <a:extLst>
                 <a:ext uri="{91240B29-F687-4f45-9708-019B960494DF}">
-                  <a14:hiddenLine xmlns="" xmlns:a14="http://schemas.microsoft.com/office/drawing/2010/main" w="9525">
+                  <a14:hiddenLine xmlns:a14="http://schemas.microsoft.com/office/drawing/2010/main" xmlns="" w="9525">
                     <a:solidFill>
                       <a:srgbClr val="000000"/>
                     </a:solidFill>
@@ -10756,7 +10755,7 @@
               </a:ln>
               <a:extLst>
                 <a:ext uri="{91240B29-F687-4f45-9708-019B960494DF}">
-                  <a14:hiddenLine xmlns="" xmlns:a14="http://schemas.microsoft.com/office/drawing/2010/main" w="9525">
+                  <a14:hiddenLine xmlns:a14="http://schemas.microsoft.com/office/drawing/2010/main" xmlns="" w="9525">
                     <a:solidFill>
                       <a:srgbClr val="000000"/>
                     </a:solidFill>
@@ -10846,7 +10845,7 @@
               </a:ln>
               <a:extLst>
                 <a:ext uri="{91240B29-F687-4f45-9708-019B960494DF}">
-                  <a14:hiddenLine xmlns="" xmlns:a14="http://schemas.microsoft.com/office/drawing/2010/main" w="9525">
+                  <a14:hiddenLine xmlns:a14="http://schemas.microsoft.com/office/drawing/2010/main" xmlns="" w="9525">
                     <a:solidFill>
                       <a:srgbClr val="000000"/>
                     </a:solidFill>
@@ -10880,7 +10879,7 @@
               </a:ln>
               <a:extLst>
                 <a:ext uri="{91240B29-F687-4f45-9708-019B960494DF}">
-                  <a14:hiddenLine xmlns="" xmlns:a14="http://schemas.microsoft.com/office/drawing/2010/main" w="9525">
+                  <a14:hiddenLine xmlns:a14="http://schemas.microsoft.com/office/drawing/2010/main" xmlns="" w="9525">
                     <a:solidFill>
                       <a:srgbClr val="000000"/>
                     </a:solidFill>
@@ -10945,7 +10944,7 @@
               </a:ln>
               <a:extLst>
                 <a:ext uri="{91240B29-F687-4f45-9708-019B960494DF}">
-                  <a14:hiddenLine xmlns="" xmlns:a14="http://schemas.microsoft.com/office/drawing/2010/main" w="9525">
+                  <a14:hiddenLine xmlns:a14="http://schemas.microsoft.com/office/drawing/2010/main" xmlns="" w="9525">
                     <a:solidFill>
                       <a:srgbClr val="000000"/>
                     </a:solidFill>
@@ -11035,7 +11034,7 @@
               </a:ln>
               <a:extLst>
                 <a:ext uri="{91240B29-F687-4f45-9708-019B960494DF}">
-                  <a14:hiddenLine xmlns="" xmlns:a14="http://schemas.microsoft.com/office/drawing/2010/main" w="9525">
+                  <a14:hiddenLine xmlns:a14="http://schemas.microsoft.com/office/drawing/2010/main" xmlns="" w="9525">
                     <a:solidFill>
                       <a:srgbClr val="000000"/>
                     </a:solidFill>
@@ -11097,7 +11096,7 @@
               </a:ln>
               <a:extLst>
                 <a:ext uri="{91240B29-F687-4f45-9708-019B960494DF}">
-                  <a14:hiddenLine xmlns="" xmlns:a14="http://schemas.microsoft.com/office/drawing/2010/main" w="9525">
+                  <a14:hiddenLine xmlns:a14="http://schemas.microsoft.com/office/drawing/2010/main" xmlns="" w="9525">
                     <a:solidFill>
                       <a:srgbClr val="000000"/>
                     </a:solidFill>
@@ -11187,7 +11186,7 @@
               </a:ln>
               <a:extLst>
                 <a:ext uri="{91240B29-F687-4f45-9708-019B960494DF}">
-                  <a14:hiddenLine xmlns="" xmlns:a14="http://schemas.microsoft.com/office/drawing/2010/main" w="9525">
+                  <a14:hiddenLine xmlns:a14="http://schemas.microsoft.com/office/drawing/2010/main" xmlns="" w="9525">
                     <a:solidFill>
                       <a:srgbClr val="000000"/>
                     </a:solidFill>
@@ -11252,7 +11251,7 @@
               </a:ln>
               <a:extLst>
                 <a:ext uri="{91240B29-F687-4f45-9708-019B960494DF}">
-                  <a14:hiddenLine xmlns="" xmlns:a14="http://schemas.microsoft.com/office/drawing/2010/main" w="9525">
+                  <a14:hiddenLine xmlns:a14="http://schemas.microsoft.com/office/drawing/2010/main" xmlns="" w="9525">
                     <a:solidFill>
                       <a:srgbClr val="000000"/>
                     </a:solidFill>
@@ -11314,7 +11313,7 @@
               </a:ln>
               <a:extLst>
                 <a:ext uri="{91240B29-F687-4f45-9708-019B960494DF}">
-                  <a14:hiddenLine xmlns="" xmlns:a14="http://schemas.microsoft.com/office/drawing/2010/main" w="9525">
+                  <a14:hiddenLine xmlns:a14="http://schemas.microsoft.com/office/drawing/2010/main" xmlns="" w="9525">
                     <a:solidFill>
                       <a:srgbClr val="000000"/>
                     </a:solidFill>
@@ -11404,7 +11403,7 @@
               </a:ln>
               <a:extLst>
                 <a:ext uri="{91240B29-F687-4f45-9708-019B960494DF}">
-                  <a14:hiddenLine xmlns="" xmlns:a14="http://schemas.microsoft.com/office/drawing/2010/main" w="9525">
+                  <a14:hiddenLine xmlns:a14="http://schemas.microsoft.com/office/drawing/2010/main" xmlns="" w="9525">
                     <a:solidFill>
                       <a:srgbClr val="000000"/>
                     </a:solidFill>
@@ -11494,7 +11493,7 @@
               </a:ln>
               <a:extLst>
                 <a:ext uri="{91240B29-F687-4f45-9708-019B960494DF}">
-                  <a14:hiddenLine xmlns="" xmlns:a14="http://schemas.microsoft.com/office/drawing/2010/main" w="9525">
+                  <a14:hiddenLine xmlns:a14="http://schemas.microsoft.com/office/drawing/2010/main" xmlns="" w="9525">
                     <a:solidFill>
                       <a:srgbClr val="000000"/>
                     </a:solidFill>
@@ -11559,7 +11558,7 @@
               </a:ln>
               <a:extLst>
                 <a:ext uri="{91240B29-F687-4f45-9708-019B960494DF}">
-                  <a14:hiddenLine xmlns="" xmlns:a14="http://schemas.microsoft.com/office/drawing/2010/main" w="9525">
+                  <a14:hiddenLine xmlns:a14="http://schemas.microsoft.com/office/drawing/2010/main" xmlns="" w="9525">
                     <a:solidFill>
                       <a:srgbClr val="000000"/>
                     </a:solidFill>
@@ -11679,7 +11678,7 @@
               </a:ln>
               <a:extLst>
                 <a:ext uri="{91240B29-F687-4f45-9708-019B960494DF}">
-                  <a14:hiddenLine xmlns="" xmlns:a14="http://schemas.microsoft.com/office/drawing/2010/main" w="9525">
+                  <a14:hiddenLine xmlns:a14="http://schemas.microsoft.com/office/drawing/2010/main" xmlns="" w="9525">
                     <a:solidFill>
                       <a:srgbClr val="000000"/>
                     </a:solidFill>
@@ -11760,7 +11759,7 @@
               </a:ln>
               <a:extLst>
                 <a:ext uri="{91240B29-F687-4f45-9708-019B960494DF}">
-                  <a14:hiddenLine xmlns="" xmlns:a14="http://schemas.microsoft.com/office/drawing/2010/main" w="9525">
+                  <a14:hiddenLine xmlns:a14="http://schemas.microsoft.com/office/drawing/2010/main" xmlns="" w="9525">
                     <a:solidFill>
                       <a:srgbClr val="000000"/>
                     </a:solidFill>
@@ -11875,7 +11874,7 @@
               </a:ln>
               <a:extLst>
                 <a:ext uri="{91240B29-F687-4f45-9708-019B960494DF}">
-                  <a14:hiddenLine xmlns="" xmlns:a14="http://schemas.microsoft.com/office/drawing/2010/main" w="9525">
+                  <a14:hiddenLine xmlns:a14="http://schemas.microsoft.com/office/drawing/2010/main" xmlns="" w="9525">
                     <a:solidFill>
                       <a:srgbClr val="000000"/>
                     </a:solidFill>
@@ -11965,7 +11964,7 @@
               </a:ln>
               <a:extLst>
                 <a:ext uri="{91240B29-F687-4f45-9708-019B960494DF}">
-                  <a14:hiddenLine xmlns="" xmlns:a14="http://schemas.microsoft.com/office/drawing/2010/main" w="9525">
+                  <a14:hiddenLine xmlns:a14="http://schemas.microsoft.com/office/drawing/2010/main" xmlns="" w="9525">
                     <a:solidFill>
                       <a:srgbClr val="000000"/>
                     </a:solidFill>
@@ -12030,7 +12029,7 @@
               </a:ln>
               <a:extLst>
                 <a:ext uri="{91240B29-F687-4f45-9708-019B960494DF}">
-                  <a14:hiddenLine xmlns="" xmlns:a14="http://schemas.microsoft.com/office/drawing/2010/main" w="9525">
+                  <a14:hiddenLine xmlns:a14="http://schemas.microsoft.com/office/drawing/2010/main" xmlns="" w="9525">
                     <a:solidFill>
                       <a:srgbClr val="000000"/>
                     </a:solidFill>
@@ -12120,7 +12119,7 @@
               </a:ln>
               <a:extLst>
                 <a:ext uri="{91240B29-F687-4f45-9708-019B960494DF}">
-                  <a14:hiddenLine xmlns="" xmlns:a14="http://schemas.microsoft.com/office/drawing/2010/main" w="9525">
+                  <a14:hiddenLine xmlns:a14="http://schemas.microsoft.com/office/drawing/2010/main" xmlns="" w="9525">
                     <a:solidFill>
                       <a:srgbClr val="000000"/>
                     </a:solidFill>
@@ -12188,7 +12187,7 @@
               </a:ln>
               <a:extLst>
                 <a:ext uri="{91240B29-F687-4f45-9708-019B960494DF}">
-                  <a14:hiddenLine xmlns="" xmlns:a14="http://schemas.microsoft.com/office/drawing/2010/main" w="9525">
+                  <a14:hiddenLine xmlns:a14="http://schemas.microsoft.com/office/drawing/2010/main" xmlns="" w="9525">
                     <a:solidFill>
                       <a:srgbClr val="000000"/>
                     </a:solidFill>
@@ -12278,7 +12277,7 @@
               </a:ln>
               <a:extLst>
                 <a:ext uri="{91240B29-F687-4f45-9708-019B960494DF}">
-                  <a14:hiddenLine xmlns="" xmlns:a14="http://schemas.microsoft.com/office/drawing/2010/main" w="9525">
+                  <a14:hiddenLine xmlns:a14="http://schemas.microsoft.com/office/drawing/2010/main" xmlns="" w="9525">
                     <a:solidFill>
                       <a:srgbClr val="000000"/>
                     </a:solidFill>
@@ -12346,7 +12345,7 @@
               </a:ln>
               <a:extLst>
                 <a:ext uri="{91240B29-F687-4f45-9708-019B960494DF}">
-                  <a14:hiddenLine xmlns="" xmlns:a14="http://schemas.microsoft.com/office/drawing/2010/main" w="9525">
+                  <a14:hiddenLine xmlns:a14="http://schemas.microsoft.com/office/drawing/2010/main" xmlns="" w="9525">
                     <a:solidFill>
                       <a:srgbClr val="000000"/>
                     </a:solidFill>
@@ -12436,7 +12435,7 @@
               </a:ln>
               <a:extLst>
                 <a:ext uri="{91240B29-F687-4f45-9708-019B960494DF}">
-                  <a14:hiddenLine xmlns="" xmlns:a14="http://schemas.microsoft.com/office/drawing/2010/main" w="9525">
+                  <a14:hiddenLine xmlns:a14="http://schemas.microsoft.com/office/drawing/2010/main" xmlns="" w="9525">
                     <a:solidFill>
                       <a:srgbClr val="000000"/>
                     </a:solidFill>
@@ -12470,7 +12469,7 @@
               </a:ln>
               <a:extLst>
                 <a:ext uri="{91240B29-F687-4f45-9708-019B960494DF}">
-                  <a14:hiddenLine xmlns="" xmlns:a14="http://schemas.microsoft.com/office/drawing/2010/main" w="9525">
+                  <a14:hiddenLine xmlns:a14="http://schemas.microsoft.com/office/drawing/2010/main" xmlns="" w="9525">
                     <a:solidFill>
                       <a:srgbClr val="000000"/>
                     </a:solidFill>
@@ -12610,7 +12609,7 @@
           <a:p>
             <a:fld id="{62B29A1C-2C6F-4F53-8817-88025C8CDCD8}" type="datetimeFigureOut">
               <a:rPr lang="en-US" smtClean="0"/>
-              <a:t>11/27/18</a:t>
+              <a:t>7/20/21</a:t>
             </a:fld>
             <a:endParaRPr lang="en-US"/>
           </a:p>
@@ -13141,171 +13140,6 @@
           <p:cNvPr id="2" name="Title 1">
             <a:extLst>
               <a:ext uri="{FF2B5EF4-FFF2-40B4-BE49-F238E27FC236}">
-                <a16:creationId xmlns:a16="http://schemas.microsoft.com/office/drawing/2014/main" id="{5FEC35EC-B61E-4144-B4A3-E8946DCDB7CA}"/>
-              </a:ext>
-            </a:extLst>
-          </p:cNvPr>
-          <p:cNvSpPr>
-            <a:spLocks noGrp="1"/>
-          </p:cNvSpPr>
-          <p:nvPr>
-            <p:ph type="title"/>
-          </p:nvPr>
-        </p:nvSpPr>
-        <p:spPr/>
-        <p:txBody>
-          <a:bodyPr/>
-          <a:lstStyle/>
-          <a:p>
-            <a:r>
-              <a:rPr lang="en-US" dirty="0">
-                <a:solidFill>
-                  <a:schemeClr val="accent2"/>
-                </a:solidFill>
-              </a:rPr>
-              <a:t>Why </a:t>
-            </a:r>
-            <a:r>
-              <a:rPr lang="en-US" dirty="0"/>
-              <a:t>use a server?</a:t>
-            </a:r>
-          </a:p>
-        </p:txBody>
-      </p:sp>
-      <p:sp>
-        <p:nvSpPr>
-          <p:cNvPr id="3" name="Content Placeholder 2">
-            <a:extLst>
-              <a:ext uri="{FF2B5EF4-FFF2-40B4-BE49-F238E27FC236}">
-                <a16:creationId xmlns:a16="http://schemas.microsoft.com/office/drawing/2014/main" id="{E167FAB0-F0F3-4550-80B6-5BADC3EE0EFC}"/>
-              </a:ext>
-            </a:extLst>
-          </p:cNvPr>
-          <p:cNvSpPr>
-            <a:spLocks noGrp="1"/>
-          </p:cNvSpPr>
-          <p:nvPr>
-            <p:ph idx="1"/>
-          </p:nvPr>
-        </p:nvSpPr>
-        <p:spPr>
-          <a:xfrm>
-            <a:off x="1141412" y="2249486"/>
-            <a:ext cx="9905999" cy="4076885"/>
-          </a:xfrm>
-        </p:spPr>
-        <p:txBody>
-          <a:bodyPr>
-            <a:normAutofit/>
-          </a:bodyPr>
-          <a:lstStyle/>
-          <a:p>
-            <a:r>
-              <a:rPr lang="en-US" dirty="0"/>
-              <a:t>Servers often have more memory and less overhead</a:t>
-            </a:r>
-          </a:p>
-          <a:p>
-            <a:pPr lvl="1"/>
-            <a:r>
-              <a:rPr lang="en-US" dirty="0"/>
-              <a:t>They don’t have to think about whether you’re about to start Pandora or play Candy Crush or open 32 Chrome tabs</a:t>
-            </a:r>
-          </a:p>
-          <a:p>
-            <a:r>
-              <a:rPr lang="en-US" dirty="0"/>
-              <a:t>Great for big data sets</a:t>
-            </a:r>
-          </a:p>
-          <a:p>
-            <a:pPr lvl="1"/>
-            <a:r>
-              <a:rPr lang="en-US" dirty="0"/>
-              <a:t>Databases</a:t>
-            </a:r>
-          </a:p>
-          <a:p>
-            <a:pPr lvl="1"/>
-            <a:r>
-              <a:rPr lang="en-US" dirty="0"/>
-              <a:t>Textual analysis (</a:t>
-            </a:r>
-            <a:r>
-              <a:rPr lang="en-US" dirty="0" err="1"/>
-              <a:t>Voyant</a:t>
-            </a:r>
-            <a:r>
-              <a:rPr lang="en-US" dirty="0"/>
-              <a:t>-Tools, </a:t>
-            </a:r>
-            <a:r>
-              <a:rPr lang="en-US" dirty="0" err="1"/>
-              <a:t>HathiTrust</a:t>
-            </a:r>
-            <a:r>
-              <a:rPr lang="en-US" dirty="0"/>
-              <a:t>, SOTU-</a:t>
-            </a:r>
-            <a:r>
-              <a:rPr lang="en-US" dirty="0" err="1"/>
-              <a:t>db</a:t>
-            </a:r>
-            <a:r>
-              <a:rPr lang="en-US" dirty="0"/>
-              <a:t> 😎)</a:t>
-            </a:r>
-          </a:p>
-          <a:p>
-            <a:r>
-              <a:rPr lang="en-US" dirty="0"/>
-              <a:t>Full control</a:t>
-            </a:r>
-          </a:p>
-          <a:p>
-            <a:pPr lvl="1"/>
-            <a:r>
-              <a:rPr lang="en-US" dirty="0"/>
-              <a:t>A great environment for learning HTML/CSS </a:t>
-            </a:r>
-          </a:p>
-        </p:txBody>
-      </p:sp>
-    </p:spTree>
-    <p:extLst>
-      <p:ext uri="{BB962C8B-B14F-4D97-AF65-F5344CB8AC3E}">
-        <p14:creationId xmlns:p14="http://schemas.microsoft.com/office/powerpoint/2010/main" val="670784547"/>
-      </p:ext>
-    </p:extLst>
-  </p:cSld>
-  <p:clrMapOvr>
-    <a:masterClrMapping/>
-  </p:clrMapOvr>
-</p:sld>
-</file>
-
-<file path=ppt/slides/slide11.xml><?xml version="1.0" encoding="utf-8"?>
-<p:sld xmlns:a="http://schemas.openxmlformats.org/drawingml/2006/main" xmlns:r="http://schemas.openxmlformats.org/officeDocument/2006/relationships" xmlns:p="http://schemas.openxmlformats.org/presentationml/2006/main">
-  <p:cSld>
-    <p:spTree>
-      <p:nvGrpSpPr>
-        <p:cNvPr id="1" name=""/>
-        <p:cNvGrpSpPr/>
-        <p:nvPr/>
-      </p:nvGrpSpPr>
-      <p:grpSpPr>
-        <a:xfrm>
-          <a:off x="0" y="0"/>
-          <a:ext cx="0" cy="0"/>
-          <a:chOff x="0" y="0"/>
-          <a:chExt cx="0" cy="0"/>
-        </a:xfrm>
-      </p:grpSpPr>
-      <p:sp>
-        <p:nvSpPr>
-          <p:cNvPr id="2" name="Title 1">
-            <a:extLst>
-              <a:ext uri="{FF2B5EF4-FFF2-40B4-BE49-F238E27FC236}">
                 <a16:creationId xmlns:a16="http://schemas.microsoft.com/office/drawing/2014/main" id="{FA22CDB8-79C8-43C5-AFFB-930D0262961F}"/>
               </a:ext>
             </a:extLst>
@@ -13454,7 +13288,7 @@
 </p:sld>
 </file>
 
-<file path=ppt/slides/slide12.xml><?xml version="1.0" encoding="utf-8"?>
+<file path=ppt/slides/slide11.xml><?xml version="1.0" encoding="utf-8"?>
 <p:sld xmlns:a="http://schemas.openxmlformats.org/drawingml/2006/main" xmlns:r="http://schemas.openxmlformats.org/officeDocument/2006/relationships" xmlns:p="http://schemas.openxmlformats.org/presentationml/2006/main">
   <p:cSld>
     <p:spTree>
@@ -13619,7 +13453,7 @@
 </p:sld>
 </file>
 
-<file path=ppt/slides/slide13.xml><?xml version="1.0" encoding="utf-8"?>
+<file path=ppt/slides/slide12.xml><?xml version="1.0" encoding="utf-8"?>
 <p:sld xmlns:a="http://schemas.openxmlformats.org/drawingml/2006/main" xmlns:r="http://schemas.openxmlformats.org/officeDocument/2006/relationships" xmlns:p="http://schemas.openxmlformats.org/presentationml/2006/main">
   <p:cSld>
     <p:spTree>
@@ -13725,7 +13559,7 @@
 </p:sld>
 </file>
 
-<file path=ppt/slides/slide14.xml><?xml version="1.0" encoding="utf-8"?>
+<file path=ppt/slides/slide13.xml><?xml version="1.0" encoding="utf-8"?>
 <p:sld xmlns:a="http://schemas.openxmlformats.org/drawingml/2006/main" xmlns:r="http://schemas.openxmlformats.org/officeDocument/2006/relationships" xmlns:p="http://schemas.openxmlformats.org/presentationml/2006/main">
   <p:cSld>
     <p:spTree>
@@ -13833,7 +13667,7 @@
 </p:sld>
 </file>
 
-<file path=ppt/slides/slide15.xml><?xml version="1.0" encoding="utf-8"?>
+<file path=ppt/slides/slide14.xml><?xml version="1.0" encoding="utf-8"?>
 <p:sld xmlns:a="http://schemas.openxmlformats.org/drawingml/2006/main" xmlns:r="http://schemas.openxmlformats.org/officeDocument/2006/relationships" xmlns:p="http://schemas.openxmlformats.org/presentationml/2006/main">
   <p:cSld>
     <p:spTree>
@@ -14153,7 +13987,7 @@
 </p:sld>
 </file>
 
-<file path=ppt/slides/slide16.xml><?xml version="1.0" encoding="utf-8"?>
+<file path=ppt/slides/slide15.xml><?xml version="1.0" encoding="utf-8"?>
 <p:sld xmlns:a="http://schemas.openxmlformats.org/drawingml/2006/main" xmlns:r="http://schemas.openxmlformats.org/officeDocument/2006/relationships" xmlns:p="http://schemas.openxmlformats.org/presentationml/2006/main">
   <p:cSld>
     <p:spTree>
@@ -14522,7 +14356,7 @@
 </p:sld>
 </file>
 
-<file path=ppt/slides/slide17.xml><?xml version="1.0" encoding="utf-8"?>
+<file path=ppt/slides/slide16.xml><?xml version="1.0" encoding="utf-8"?>
 <p:sld xmlns:a="http://schemas.openxmlformats.org/drawingml/2006/main" xmlns:r="http://schemas.openxmlformats.org/officeDocument/2006/relationships" xmlns:p="http://schemas.openxmlformats.org/presentationml/2006/main">
   <p:cSld>
     <p:spTree>
@@ -14915,7 +14749,7 @@
 </p:sld>
 </file>
 
-<file path=ppt/slides/slide18.xml><?xml version="1.0" encoding="utf-8"?>
+<file path=ppt/slides/slide17.xml><?xml version="1.0" encoding="utf-8"?>
 <p:sld xmlns:a="http://schemas.openxmlformats.org/drawingml/2006/main" xmlns:r="http://schemas.openxmlformats.org/officeDocument/2006/relationships" xmlns:p="http://schemas.openxmlformats.org/presentationml/2006/main">
   <p:cSld>
     <p:spTree>
@@ -15444,7 +15278,7 @@
 </p:sld>
 </file>
 
-<file path=ppt/slides/slide19.xml><?xml version="1.0" encoding="utf-8"?>
+<file path=ppt/slides/slide18.xml><?xml version="1.0" encoding="utf-8"?>
 <p:sld xmlns:a="http://schemas.openxmlformats.org/drawingml/2006/main" xmlns:r="http://schemas.openxmlformats.org/officeDocument/2006/relationships" xmlns:p="http://schemas.openxmlformats.org/presentationml/2006/main">
   <p:cSld>
     <p:spTree>
@@ -15990,7 +15824,6 @@
                 <a:lumMod val="90000"/>
               </a:schemeClr>
             </a:duotone>
-            <a:extLst/>
           </a:blip>
           <a:stretch/>
         </a:blipFill>
@@ -16560,7 +16393,6 @@
                 <a:lumMod val="90000"/>
               </a:schemeClr>
             </a:duotone>
-            <a:extLst/>
           </a:blip>
           <a:stretch/>
         </a:blipFill>
@@ -16636,7 +16468,7 @@
           <a:noFill/>
           <a:extLst>
             <a:ext uri="{909E8E84-426E-40dd-AFC4-6F175D3DCCD1}">
-              <a14:hiddenFill xmlns:a14="http://schemas.microsoft.com/office/drawing/2010/main" xmlns:p14="http://schemas.microsoft.com/office/powerpoint/2010/main" xmlns:a16="http://schemas.microsoft.com/office/drawing/2014/main" xmlns="">
+              <a14:hiddenFill xmlns="" xmlns:a16="http://schemas.microsoft.com/office/drawing/2014/main" xmlns:p14="http://schemas.microsoft.com/office/powerpoint/2010/main" xmlns:a14="http://schemas.microsoft.com/office/drawing/2010/main">
                 <a:solidFill>
                   <a:srgbClr val="FFFFFF"/>
                 </a:solidFill>
@@ -16727,7 +16559,7 @@
             </a:ln>
             <a:extLst>
               <a:ext uri="{91240B29-F687-4f45-9708-019B960494DF}">
-                <a14:hiddenLine xmlns:a14="http://schemas.microsoft.com/office/drawing/2010/main" xmlns:p14="http://schemas.microsoft.com/office/powerpoint/2010/main" xmlns:a16="http://schemas.microsoft.com/office/drawing/2014/main" xmlns="" w="9525">
+                <a14:hiddenLine xmlns="" xmlns:a16="http://schemas.microsoft.com/office/drawing/2014/main" xmlns:p14="http://schemas.microsoft.com/office/powerpoint/2010/main" xmlns:a14="http://schemas.microsoft.com/office/drawing/2010/main" w="9525">
                   <a:solidFill>
                     <a:srgbClr val="000000"/>
                   </a:solidFill>
@@ -16832,7 +16664,7 @@
             </a:ln>
             <a:extLst>
               <a:ext uri="{91240B29-F687-4f45-9708-019B960494DF}">
-                <a14:hiddenLine xmlns:a14="http://schemas.microsoft.com/office/drawing/2010/main" xmlns:p14="http://schemas.microsoft.com/office/powerpoint/2010/main" xmlns:a16="http://schemas.microsoft.com/office/drawing/2014/main" xmlns="" w="9525">
+                <a14:hiddenLine xmlns="" xmlns:a16="http://schemas.microsoft.com/office/drawing/2014/main" xmlns:p14="http://schemas.microsoft.com/office/powerpoint/2010/main" xmlns:a14="http://schemas.microsoft.com/office/drawing/2010/main" w="9525">
                   <a:solidFill>
                     <a:srgbClr val="000000"/>
                   </a:solidFill>
@@ -16937,7 +16769,7 @@
             </a:ln>
             <a:extLst>
               <a:ext uri="{91240B29-F687-4f45-9708-019B960494DF}">
-                <a14:hiddenLine xmlns:a14="http://schemas.microsoft.com/office/drawing/2010/main" xmlns:p14="http://schemas.microsoft.com/office/powerpoint/2010/main" xmlns:a16="http://schemas.microsoft.com/office/drawing/2014/main" xmlns="" w="9525">
+                <a14:hiddenLine xmlns="" xmlns:a16="http://schemas.microsoft.com/office/drawing/2014/main" xmlns:p14="http://schemas.microsoft.com/office/powerpoint/2010/main" xmlns:a14="http://schemas.microsoft.com/office/drawing/2010/main" w="9525">
                   <a:solidFill>
                     <a:srgbClr val="000000"/>
                   </a:solidFill>
@@ -16986,7 +16818,7 @@
             </a:ln>
             <a:extLst>
               <a:ext uri="{91240B29-F687-4f45-9708-019B960494DF}">
-                <a14:hiddenLine xmlns:a14="http://schemas.microsoft.com/office/drawing/2010/main" xmlns:p14="http://schemas.microsoft.com/office/powerpoint/2010/main" xmlns:a16="http://schemas.microsoft.com/office/drawing/2014/main" xmlns="" w="9525">
+                <a14:hiddenLine xmlns="" xmlns:a16="http://schemas.microsoft.com/office/drawing/2014/main" xmlns:p14="http://schemas.microsoft.com/office/powerpoint/2010/main" xmlns:a14="http://schemas.microsoft.com/office/drawing/2010/main" w="9525">
                   <a:solidFill>
                     <a:srgbClr val="000000"/>
                   </a:solidFill>
@@ -17091,7 +16923,7 @@
             </a:ln>
             <a:extLst>
               <a:ext uri="{91240B29-F687-4f45-9708-019B960494DF}">
-                <a14:hiddenLine xmlns:a14="http://schemas.microsoft.com/office/drawing/2010/main" xmlns:p14="http://schemas.microsoft.com/office/powerpoint/2010/main" xmlns:a16="http://schemas.microsoft.com/office/drawing/2014/main" xmlns="" w="9525">
+                <a14:hiddenLine xmlns="" xmlns:a16="http://schemas.microsoft.com/office/drawing/2014/main" xmlns:p14="http://schemas.microsoft.com/office/powerpoint/2010/main" xmlns:a14="http://schemas.microsoft.com/office/drawing/2010/main" w="9525">
                   <a:solidFill>
                     <a:srgbClr val="000000"/>
                   </a:solidFill>
@@ -17168,7 +17000,7 @@
             </a:ln>
             <a:extLst>
               <a:ext uri="{91240B29-F687-4f45-9708-019B960494DF}">
-                <a14:hiddenLine xmlns:a14="http://schemas.microsoft.com/office/drawing/2010/main" xmlns:p14="http://schemas.microsoft.com/office/powerpoint/2010/main" xmlns:a16="http://schemas.microsoft.com/office/drawing/2014/main" xmlns="" w="9525">
+                <a14:hiddenLine xmlns="" xmlns:a16="http://schemas.microsoft.com/office/drawing/2014/main" xmlns:p14="http://schemas.microsoft.com/office/powerpoint/2010/main" xmlns:a14="http://schemas.microsoft.com/office/drawing/2010/main" w="9525">
                   <a:solidFill>
                     <a:srgbClr val="000000"/>
                   </a:solidFill>
@@ -17245,7 +17077,7 @@
             </a:ln>
             <a:extLst>
               <a:ext uri="{91240B29-F687-4f45-9708-019B960494DF}">
-                <a14:hiddenLine xmlns:a14="http://schemas.microsoft.com/office/drawing/2010/main" xmlns:p14="http://schemas.microsoft.com/office/powerpoint/2010/main" xmlns:a16="http://schemas.microsoft.com/office/drawing/2014/main" xmlns="" w="9525">
+                <a14:hiddenLine xmlns="" xmlns:a16="http://schemas.microsoft.com/office/drawing/2014/main" xmlns:p14="http://schemas.microsoft.com/office/powerpoint/2010/main" xmlns:a14="http://schemas.microsoft.com/office/drawing/2010/main" w="9525">
                   <a:solidFill>
                     <a:srgbClr val="000000"/>
                   </a:solidFill>
@@ -17350,7 +17182,7 @@
             </a:ln>
             <a:extLst>
               <a:ext uri="{91240B29-F687-4f45-9708-019B960494DF}">
-                <a14:hiddenLine xmlns:a14="http://schemas.microsoft.com/office/drawing/2010/main" xmlns:p14="http://schemas.microsoft.com/office/powerpoint/2010/main" xmlns:a16="http://schemas.microsoft.com/office/drawing/2014/main" xmlns="" w="9525">
+                <a14:hiddenLine xmlns="" xmlns:a16="http://schemas.microsoft.com/office/drawing/2014/main" xmlns:p14="http://schemas.microsoft.com/office/powerpoint/2010/main" xmlns:a14="http://schemas.microsoft.com/office/drawing/2010/main" w="9525">
                   <a:solidFill>
                     <a:srgbClr val="000000"/>
                   </a:solidFill>
@@ -17427,7 +17259,7 @@
             </a:ln>
             <a:extLst>
               <a:ext uri="{91240B29-F687-4f45-9708-019B960494DF}">
-                <a14:hiddenLine xmlns:a14="http://schemas.microsoft.com/office/drawing/2010/main" xmlns:p14="http://schemas.microsoft.com/office/powerpoint/2010/main" xmlns:a16="http://schemas.microsoft.com/office/drawing/2014/main" xmlns="" w="9525">
+                <a14:hiddenLine xmlns="" xmlns:a16="http://schemas.microsoft.com/office/drawing/2014/main" xmlns:p14="http://schemas.microsoft.com/office/powerpoint/2010/main" xmlns:a14="http://schemas.microsoft.com/office/drawing/2010/main" w="9525">
                   <a:solidFill>
                     <a:srgbClr val="000000"/>
                   </a:solidFill>
@@ -17504,7 +17336,7 @@
             </a:ln>
             <a:extLst>
               <a:ext uri="{91240B29-F687-4f45-9708-019B960494DF}">
-                <a14:hiddenLine xmlns:a14="http://schemas.microsoft.com/office/drawing/2010/main" xmlns:p14="http://schemas.microsoft.com/office/powerpoint/2010/main" xmlns:a16="http://schemas.microsoft.com/office/drawing/2014/main" xmlns="" w="9525">
+                <a14:hiddenLine xmlns="" xmlns:a16="http://schemas.microsoft.com/office/drawing/2014/main" xmlns:p14="http://schemas.microsoft.com/office/powerpoint/2010/main" xmlns:a14="http://schemas.microsoft.com/office/drawing/2010/main" w="9525">
                   <a:solidFill>
                     <a:srgbClr val="000000"/>
                   </a:solidFill>
@@ -17609,7 +17441,7 @@
             </a:ln>
             <a:extLst>
               <a:ext uri="{91240B29-F687-4f45-9708-019B960494DF}">
-                <a14:hiddenLine xmlns:a14="http://schemas.microsoft.com/office/drawing/2010/main" xmlns:p14="http://schemas.microsoft.com/office/powerpoint/2010/main" xmlns:a16="http://schemas.microsoft.com/office/drawing/2014/main" xmlns="" w="9525">
+                <a14:hiddenLine xmlns="" xmlns:a16="http://schemas.microsoft.com/office/drawing/2014/main" xmlns:p14="http://schemas.microsoft.com/office/powerpoint/2010/main" xmlns:a14="http://schemas.microsoft.com/office/drawing/2010/main" w="9525">
                   <a:solidFill>
                     <a:srgbClr val="000000"/>
                   </a:solidFill>
@@ -17714,7 +17546,7 @@
             </a:ln>
             <a:extLst>
               <a:ext uri="{91240B29-F687-4f45-9708-019B960494DF}">
-                <a14:hiddenLine xmlns:a14="http://schemas.microsoft.com/office/drawing/2010/main" xmlns:p14="http://schemas.microsoft.com/office/powerpoint/2010/main" xmlns:a16="http://schemas.microsoft.com/office/drawing/2014/main" xmlns="" w="9525">
+                <a14:hiddenLine xmlns="" xmlns:a16="http://schemas.microsoft.com/office/drawing/2014/main" xmlns:p14="http://schemas.microsoft.com/office/powerpoint/2010/main" xmlns:a14="http://schemas.microsoft.com/office/drawing/2010/main" w="9525">
                   <a:solidFill>
                     <a:srgbClr val="000000"/>
                   </a:solidFill>
@@ -17791,7 +17623,7 @@
             </a:ln>
             <a:extLst>
               <a:ext uri="{91240B29-F687-4f45-9708-019B960494DF}">
-                <a14:hiddenLine xmlns:a14="http://schemas.microsoft.com/office/drawing/2010/main" xmlns:p14="http://schemas.microsoft.com/office/powerpoint/2010/main" xmlns:a16="http://schemas.microsoft.com/office/drawing/2014/main" xmlns="" w="9525">
+                <a14:hiddenLine xmlns="" xmlns:a16="http://schemas.microsoft.com/office/drawing/2014/main" xmlns:p14="http://schemas.microsoft.com/office/powerpoint/2010/main" xmlns:a14="http://schemas.microsoft.com/office/drawing/2010/main" w="9525">
                   <a:solidFill>
                     <a:srgbClr val="000000"/>
                   </a:solidFill>
@@ -17916,7 +17748,7 @@
             </a:ln>
             <a:extLst>
               <a:ext uri="{91240B29-F687-4f45-9708-019B960494DF}">
-                <a14:hiddenLine xmlns:a14="http://schemas.microsoft.com/office/drawing/2010/main" xmlns:p14="http://schemas.microsoft.com/office/powerpoint/2010/main" xmlns:a16="http://schemas.microsoft.com/office/drawing/2014/main" xmlns="" w="9525">
+                <a14:hiddenLine xmlns="" xmlns:a16="http://schemas.microsoft.com/office/drawing/2014/main" xmlns:p14="http://schemas.microsoft.com/office/powerpoint/2010/main" xmlns:a14="http://schemas.microsoft.com/office/drawing/2010/main" w="9525">
                   <a:solidFill>
                     <a:srgbClr val="000000"/>
                   </a:solidFill>
@@ -17993,7 +17825,7 @@
             </a:ln>
             <a:extLst>
               <a:ext uri="{91240B29-F687-4f45-9708-019B960494DF}">
-                <a14:hiddenLine xmlns:a14="http://schemas.microsoft.com/office/drawing/2010/main" xmlns:p14="http://schemas.microsoft.com/office/powerpoint/2010/main" xmlns:a16="http://schemas.microsoft.com/office/drawing/2014/main" xmlns="" w="9525">
+                <a14:hiddenLine xmlns="" xmlns:a16="http://schemas.microsoft.com/office/drawing/2014/main" xmlns:p14="http://schemas.microsoft.com/office/powerpoint/2010/main" xmlns:a14="http://schemas.microsoft.com/office/drawing/2010/main" w="9525">
                   <a:solidFill>
                     <a:srgbClr val="000000"/>
                   </a:solidFill>
@@ -18098,7 +17930,7 @@
             </a:ln>
             <a:extLst>
               <a:ext uri="{91240B29-F687-4f45-9708-019B960494DF}">
-                <a14:hiddenLine xmlns:a14="http://schemas.microsoft.com/office/drawing/2010/main" xmlns:p14="http://schemas.microsoft.com/office/powerpoint/2010/main" xmlns:a16="http://schemas.microsoft.com/office/drawing/2014/main" xmlns="" w="9525">
+                <a14:hiddenLine xmlns="" xmlns:a16="http://schemas.microsoft.com/office/drawing/2014/main" xmlns:p14="http://schemas.microsoft.com/office/powerpoint/2010/main" xmlns:a14="http://schemas.microsoft.com/office/drawing/2010/main" w="9525">
                   <a:solidFill>
                     <a:srgbClr val="000000"/>
                   </a:solidFill>
@@ -18203,7 +18035,7 @@
             </a:ln>
             <a:extLst>
               <a:ext uri="{91240B29-F687-4f45-9708-019B960494DF}">
-                <a14:hiddenLine xmlns:a14="http://schemas.microsoft.com/office/drawing/2010/main" xmlns:p14="http://schemas.microsoft.com/office/powerpoint/2010/main" xmlns:a16="http://schemas.microsoft.com/office/drawing/2014/main" xmlns="" w="9525">
+                <a14:hiddenLine xmlns="" xmlns:a16="http://schemas.microsoft.com/office/drawing/2014/main" xmlns:p14="http://schemas.microsoft.com/office/powerpoint/2010/main" xmlns:a14="http://schemas.microsoft.com/office/drawing/2010/main" w="9525">
                   <a:solidFill>
                     <a:srgbClr val="000000"/>
                   </a:solidFill>
@@ -18280,7 +18112,7 @@
             </a:ln>
             <a:extLst>
               <a:ext uri="{91240B29-F687-4f45-9708-019B960494DF}">
-                <a14:hiddenLine xmlns:a14="http://schemas.microsoft.com/office/drawing/2010/main" xmlns:p14="http://schemas.microsoft.com/office/powerpoint/2010/main" xmlns:a16="http://schemas.microsoft.com/office/drawing/2014/main" xmlns="" w="9525">
+                <a14:hiddenLine xmlns="" xmlns:a16="http://schemas.microsoft.com/office/drawing/2014/main" xmlns:p14="http://schemas.microsoft.com/office/powerpoint/2010/main" xmlns:a14="http://schemas.microsoft.com/office/drawing/2010/main" w="9525">
                   <a:solidFill>
                     <a:srgbClr val="000000"/>
                   </a:solidFill>
@@ -18385,7 +18217,7 @@
             </a:ln>
             <a:extLst>
               <a:ext uri="{91240B29-F687-4f45-9708-019B960494DF}">
-                <a14:hiddenLine xmlns:a14="http://schemas.microsoft.com/office/drawing/2010/main" xmlns:p14="http://schemas.microsoft.com/office/powerpoint/2010/main" xmlns:a16="http://schemas.microsoft.com/office/drawing/2014/main" xmlns="" w="9525">
+                <a14:hiddenLine xmlns="" xmlns:a16="http://schemas.microsoft.com/office/drawing/2014/main" xmlns:p14="http://schemas.microsoft.com/office/powerpoint/2010/main" xmlns:a14="http://schemas.microsoft.com/office/drawing/2010/main" w="9525">
                   <a:solidFill>
                     <a:srgbClr val="000000"/>
                   </a:solidFill>
@@ -18490,7 +18322,7 @@
             </a:ln>
             <a:extLst>
               <a:ext uri="{91240B29-F687-4f45-9708-019B960494DF}">
-                <a14:hiddenLine xmlns:a14="http://schemas.microsoft.com/office/drawing/2010/main" xmlns:p14="http://schemas.microsoft.com/office/powerpoint/2010/main" xmlns:a16="http://schemas.microsoft.com/office/drawing/2014/main" xmlns="" w="9525">
+                <a14:hiddenLine xmlns="" xmlns:a16="http://schemas.microsoft.com/office/drawing/2014/main" xmlns:p14="http://schemas.microsoft.com/office/powerpoint/2010/main" xmlns:a14="http://schemas.microsoft.com/office/drawing/2010/main" w="9525">
                   <a:solidFill>
                     <a:srgbClr val="000000"/>
                   </a:solidFill>
@@ -18561,7 +18393,7 @@
             </a:ln>
             <a:extLst>
               <a:ext uri="{91240B29-F687-4f45-9708-019B960494DF}">
-                <a14:hiddenLine xmlns:a14="http://schemas.microsoft.com/office/drawing/2010/main" xmlns:p14="http://schemas.microsoft.com/office/powerpoint/2010/main" xmlns:a16="http://schemas.microsoft.com/office/drawing/2014/main" xmlns="" w="9525">
+                <a14:hiddenLine xmlns="" xmlns:a16="http://schemas.microsoft.com/office/drawing/2014/main" xmlns:p14="http://schemas.microsoft.com/office/powerpoint/2010/main" xmlns:a14="http://schemas.microsoft.com/office/drawing/2010/main" w="9525">
                   <a:solidFill>
                     <a:srgbClr val="000000"/>
                   </a:solidFill>
@@ -18666,7 +18498,7 @@
             </a:ln>
             <a:extLst>
               <a:ext uri="{91240B29-F687-4f45-9708-019B960494DF}">
-                <a14:hiddenLine xmlns:a14="http://schemas.microsoft.com/office/drawing/2010/main" xmlns:p14="http://schemas.microsoft.com/office/powerpoint/2010/main" xmlns:a16="http://schemas.microsoft.com/office/drawing/2014/main" xmlns="" w="9525">
+                <a14:hiddenLine xmlns="" xmlns:a16="http://schemas.microsoft.com/office/drawing/2014/main" xmlns:p14="http://schemas.microsoft.com/office/powerpoint/2010/main" xmlns:a14="http://schemas.microsoft.com/office/drawing/2010/main" w="9525">
                   <a:solidFill>
                     <a:srgbClr val="000000"/>
                   </a:solidFill>
@@ -18737,7 +18569,7 @@
             </a:ln>
             <a:extLst>
               <a:ext uri="{91240B29-F687-4f45-9708-019B960494DF}">
-                <a14:hiddenLine xmlns:a14="http://schemas.microsoft.com/office/drawing/2010/main" xmlns:p14="http://schemas.microsoft.com/office/powerpoint/2010/main" xmlns:a16="http://schemas.microsoft.com/office/drawing/2014/main" xmlns="" w="9525">
+                <a14:hiddenLine xmlns="" xmlns:a16="http://schemas.microsoft.com/office/drawing/2014/main" xmlns:p14="http://schemas.microsoft.com/office/powerpoint/2010/main" xmlns:a14="http://schemas.microsoft.com/office/drawing/2010/main" w="9525">
                   <a:solidFill>
                     <a:srgbClr val="000000"/>
                   </a:solidFill>
@@ -18842,7 +18674,7 @@
             </a:ln>
             <a:extLst>
               <a:ext uri="{91240B29-F687-4f45-9708-019B960494DF}">
-                <a14:hiddenLine xmlns:a14="http://schemas.microsoft.com/office/drawing/2010/main" xmlns:p14="http://schemas.microsoft.com/office/powerpoint/2010/main" xmlns:a16="http://schemas.microsoft.com/office/drawing/2014/main" xmlns="" w="9525">
+                <a14:hiddenLine xmlns="" xmlns:a16="http://schemas.microsoft.com/office/drawing/2014/main" xmlns:p14="http://schemas.microsoft.com/office/powerpoint/2010/main" xmlns:a14="http://schemas.microsoft.com/office/drawing/2010/main" w="9525">
                   <a:solidFill>
                     <a:srgbClr val="000000"/>
                   </a:solidFill>
@@ -18925,7 +18757,7 @@
             </a:ln>
             <a:extLst>
               <a:ext uri="{91240B29-F687-4f45-9708-019B960494DF}">
-                <a14:hiddenLine xmlns:a14="http://schemas.microsoft.com/office/drawing/2010/main" xmlns:p14="http://schemas.microsoft.com/office/powerpoint/2010/main" xmlns:a16="http://schemas.microsoft.com/office/drawing/2014/main" xmlns="" w="9525">
+                <a14:hiddenLine xmlns="" xmlns:a16="http://schemas.microsoft.com/office/drawing/2014/main" xmlns:p14="http://schemas.microsoft.com/office/powerpoint/2010/main" xmlns:a14="http://schemas.microsoft.com/office/drawing/2010/main" w="9525">
                   <a:solidFill>
                     <a:srgbClr val="000000"/>
                   </a:solidFill>
@@ -19030,7 +18862,7 @@
             </a:ln>
             <a:extLst>
               <a:ext uri="{91240B29-F687-4f45-9708-019B960494DF}">
-                <a14:hiddenLine xmlns:a14="http://schemas.microsoft.com/office/drawing/2010/main" xmlns:p14="http://schemas.microsoft.com/office/powerpoint/2010/main" xmlns:a16="http://schemas.microsoft.com/office/drawing/2014/main" xmlns="" w="9525">
+                <a14:hiddenLine xmlns="" xmlns:a16="http://schemas.microsoft.com/office/drawing/2014/main" xmlns:p14="http://schemas.microsoft.com/office/powerpoint/2010/main" xmlns:a14="http://schemas.microsoft.com/office/drawing/2010/main" w="9525">
                   <a:solidFill>
                     <a:srgbClr val="000000"/>
                   </a:solidFill>
@@ -19113,7 +18945,7 @@
             </a:ln>
             <a:extLst>
               <a:ext uri="{91240B29-F687-4f45-9708-019B960494DF}">
-                <a14:hiddenLine xmlns:a14="http://schemas.microsoft.com/office/drawing/2010/main" xmlns:p14="http://schemas.microsoft.com/office/powerpoint/2010/main" xmlns:a16="http://schemas.microsoft.com/office/drawing/2014/main" xmlns="" w="9525">
+                <a14:hiddenLine xmlns="" xmlns:a16="http://schemas.microsoft.com/office/drawing/2014/main" xmlns:p14="http://schemas.microsoft.com/office/powerpoint/2010/main" xmlns:a14="http://schemas.microsoft.com/office/drawing/2010/main" w="9525">
                   <a:solidFill>
                     <a:srgbClr val="000000"/>
                   </a:solidFill>
@@ -19218,7 +19050,7 @@
             </a:ln>
             <a:extLst>
               <a:ext uri="{91240B29-F687-4f45-9708-019B960494DF}">
-                <a14:hiddenLine xmlns:a14="http://schemas.microsoft.com/office/drawing/2010/main" xmlns:p14="http://schemas.microsoft.com/office/powerpoint/2010/main" xmlns:a16="http://schemas.microsoft.com/office/drawing/2014/main" xmlns="" w="9525">
+                <a14:hiddenLine xmlns="" xmlns:a16="http://schemas.microsoft.com/office/drawing/2014/main" xmlns:p14="http://schemas.microsoft.com/office/powerpoint/2010/main" xmlns:a14="http://schemas.microsoft.com/office/drawing/2010/main" w="9525">
                   <a:solidFill>
                     <a:srgbClr val="000000"/>
                   </a:solidFill>
@@ -19267,7 +19099,7 @@
             </a:ln>
             <a:extLst>
               <a:ext uri="{91240B29-F687-4f45-9708-019B960494DF}">
-                <a14:hiddenLine xmlns:a14="http://schemas.microsoft.com/office/drawing/2010/main" xmlns:p14="http://schemas.microsoft.com/office/powerpoint/2010/main" xmlns:a16="http://schemas.microsoft.com/office/drawing/2014/main" xmlns="" w="9525">
+                <a14:hiddenLine xmlns="" xmlns:a16="http://schemas.microsoft.com/office/drawing/2014/main" xmlns:p14="http://schemas.microsoft.com/office/powerpoint/2010/main" xmlns:a14="http://schemas.microsoft.com/office/drawing/2010/main" w="9525">
                   <a:solidFill>
                     <a:srgbClr val="000000"/>
                   </a:solidFill>
@@ -19372,7 +19204,7 @@
             </a:ln>
             <a:extLst>
               <a:ext uri="{91240B29-F687-4f45-9708-019B960494DF}">
-                <a14:hiddenLine xmlns:a14="http://schemas.microsoft.com/office/drawing/2010/main" xmlns:p14="http://schemas.microsoft.com/office/powerpoint/2010/main" xmlns:a16="http://schemas.microsoft.com/office/drawing/2014/main" xmlns="" w="9525">
+                <a14:hiddenLine xmlns="" xmlns:a16="http://schemas.microsoft.com/office/drawing/2014/main" xmlns:p14="http://schemas.microsoft.com/office/powerpoint/2010/main" xmlns:a14="http://schemas.microsoft.com/office/drawing/2010/main" w="9525">
                   <a:solidFill>
                     <a:srgbClr val="000000"/>
                   </a:solidFill>
@@ -19449,7 +19281,7 @@
             </a:ln>
             <a:extLst>
               <a:ext uri="{91240B29-F687-4f45-9708-019B960494DF}">
-                <a14:hiddenLine xmlns:a14="http://schemas.microsoft.com/office/drawing/2010/main" xmlns:p14="http://schemas.microsoft.com/office/powerpoint/2010/main" xmlns:a16="http://schemas.microsoft.com/office/drawing/2014/main" xmlns="" w="9525">
+                <a14:hiddenLine xmlns="" xmlns:a16="http://schemas.microsoft.com/office/drawing/2014/main" xmlns:p14="http://schemas.microsoft.com/office/powerpoint/2010/main" xmlns:a14="http://schemas.microsoft.com/office/drawing/2010/main" w="9525">
                   <a:solidFill>
                     <a:srgbClr val="000000"/>
                   </a:solidFill>
@@ -19526,7 +19358,7 @@
             </a:ln>
             <a:extLst>
               <a:ext uri="{91240B29-F687-4f45-9708-019B960494DF}">
-                <a14:hiddenLine xmlns:a14="http://schemas.microsoft.com/office/drawing/2010/main" xmlns:p14="http://schemas.microsoft.com/office/powerpoint/2010/main" xmlns:a16="http://schemas.microsoft.com/office/drawing/2014/main" xmlns="" w="9525">
+                <a14:hiddenLine xmlns="" xmlns:a16="http://schemas.microsoft.com/office/drawing/2014/main" xmlns:p14="http://schemas.microsoft.com/office/powerpoint/2010/main" xmlns:a14="http://schemas.microsoft.com/office/drawing/2010/main" w="9525">
                   <a:solidFill>
                     <a:srgbClr val="000000"/>
                   </a:solidFill>
@@ -19631,7 +19463,7 @@
             </a:ln>
             <a:extLst>
               <a:ext uri="{91240B29-F687-4f45-9708-019B960494DF}">
-                <a14:hiddenLine xmlns:a14="http://schemas.microsoft.com/office/drawing/2010/main" xmlns:p14="http://schemas.microsoft.com/office/powerpoint/2010/main" xmlns:a16="http://schemas.microsoft.com/office/drawing/2014/main" xmlns="" w="9525">
+                <a14:hiddenLine xmlns="" xmlns:a16="http://schemas.microsoft.com/office/drawing/2014/main" xmlns:p14="http://schemas.microsoft.com/office/powerpoint/2010/main" xmlns:a14="http://schemas.microsoft.com/office/drawing/2010/main" w="9525">
                   <a:solidFill>
                     <a:srgbClr val="000000"/>
                   </a:solidFill>
@@ -19714,7 +19546,7 @@
             </a:ln>
             <a:extLst>
               <a:ext uri="{91240B29-F687-4f45-9708-019B960494DF}">
-                <a14:hiddenLine xmlns:a14="http://schemas.microsoft.com/office/drawing/2010/main" xmlns:p14="http://schemas.microsoft.com/office/powerpoint/2010/main" xmlns:a16="http://schemas.microsoft.com/office/drawing/2014/main" xmlns="" w="9525">
+                <a14:hiddenLine xmlns="" xmlns:a16="http://schemas.microsoft.com/office/drawing/2014/main" xmlns:p14="http://schemas.microsoft.com/office/powerpoint/2010/main" xmlns:a14="http://schemas.microsoft.com/office/drawing/2010/main" w="9525">
                   <a:solidFill>
                     <a:srgbClr val="000000"/>
                   </a:solidFill>
@@ -19791,7 +19623,7 @@
             </a:ln>
             <a:extLst>
               <a:ext uri="{91240B29-F687-4f45-9708-019B960494DF}">
-                <a14:hiddenLine xmlns:a14="http://schemas.microsoft.com/office/drawing/2010/main" xmlns:p14="http://schemas.microsoft.com/office/powerpoint/2010/main" xmlns:a16="http://schemas.microsoft.com/office/drawing/2014/main" xmlns="" w="9525">
+                <a14:hiddenLine xmlns="" xmlns:a16="http://schemas.microsoft.com/office/drawing/2014/main" xmlns:p14="http://schemas.microsoft.com/office/powerpoint/2010/main" xmlns:a14="http://schemas.microsoft.com/office/drawing/2010/main" w="9525">
                   <a:solidFill>
                     <a:srgbClr val="000000"/>
                   </a:solidFill>
@@ -19896,7 +19728,7 @@
             </a:ln>
             <a:extLst>
               <a:ext uri="{91240B29-F687-4f45-9708-019B960494DF}">
-                <a14:hiddenLine xmlns:a14="http://schemas.microsoft.com/office/drawing/2010/main" xmlns:p14="http://schemas.microsoft.com/office/powerpoint/2010/main" xmlns:a16="http://schemas.microsoft.com/office/drawing/2014/main" xmlns="" w="9525">
+                <a14:hiddenLine xmlns="" xmlns:a16="http://schemas.microsoft.com/office/drawing/2014/main" xmlns:p14="http://schemas.microsoft.com/office/powerpoint/2010/main" xmlns:a14="http://schemas.microsoft.com/office/drawing/2010/main" w="9525">
                   <a:solidFill>
                     <a:srgbClr val="000000"/>
                   </a:solidFill>
@@ -19973,7 +19805,7 @@
             </a:ln>
             <a:extLst>
               <a:ext uri="{91240B29-F687-4f45-9708-019B960494DF}">
-                <a14:hiddenLine xmlns:a14="http://schemas.microsoft.com/office/drawing/2010/main" xmlns:p14="http://schemas.microsoft.com/office/powerpoint/2010/main" xmlns:a16="http://schemas.microsoft.com/office/drawing/2014/main" xmlns="" w="9525">
+                <a14:hiddenLine xmlns="" xmlns:a16="http://schemas.microsoft.com/office/drawing/2014/main" xmlns:p14="http://schemas.microsoft.com/office/powerpoint/2010/main" xmlns:a14="http://schemas.microsoft.com/office/drawing/2010/main" w="9525">
                   <a:solidFill>
                     <a:srgbClr val="000000"/>
                   </a:solidFill>
@@ -20078,7 +19910,7 @@
             </a:ln>
             <a:extLst>
               <a:ext uri="{91240B29-F687-4f45-9708-019B960494DF}">
-                <a14:hiddenLine xmlns:a14="http://schemas.microsoft.com/office/drawing/2010/main" xmlns:p14="http://schemas.microsoft.com/office/powerpoint/2010/main" xmlns:a16="http://schemas.microsoft.com/office/drawing/2014/main" xmlns="" w="9525">
+                <a14:hiddenLine xmlns="" xmlns:a16="http://schemas.microsoft.com/office/drawing/2014/main" xmlns:p14="http://schemas.microsoft.com/office/powerpoint/2010/main" xmlns:a14="http://schemas.microsoft.com/office/drawing/2010/main" w="9525">
                   <a:solidFill>
                     <a:srgbClr val="000000"/>
                   </a:solidFill>
@@ -20155,7 +19987,7 @@
             </a:ln>
             <a:extLst>
               <a:ext uri="{91240B29-F687-4f45-9708-019B960494DF}">
-                <a14:hiddenLine xmlns:a14="http://schemas.microsoft.com/office/drawing/2010/main" xmlns:p14="http://schemas.microsoft.com/office/powerpoint/2010/main" xmlns:a16="http://schemas.microsoft.com/office/drawing/2014/main" xmlns="" w="9525">
+                <a14:hiddenLine xmlns="" xmlns:a16="http://schemas.microsoft.com/office/drawing/2014/main" xmlns:p14="http://schemas.microsoft.com/office/powerpoint/2010/main" xmlns:a14="http://schemas.microsoft.com/office/drawing/2010/main" w="9525">
                   <a:solidFill>
                     <a:srgbClr val="000000"/>
                   </a:solidFill>
@@ -20260,7 +20092,7 @@
             </a:ln>
             <a:extLst>
               <a:ext uri="{91240B29-F687-4f45-9708-019B960494DF}">
-                <a14:hiddenLine xmlns:a14="http://schemas.microsoft.com/office/drawing/2010/main" xmlns:p14="http://schemas.microsoft.com/office/powerpoint/2010/main" xmlns:a16="http://schemas.microsoft.com/office/drawing/2014/main" xmlns="" w="9525">
+                <a14:hiddenLine xmlns="" xmlns:a16="http://schemas.microsoft.com/office/drawing/2014/main" xmlns:p14="http://schemas.microsoft.com/office/powerpoint/2010/main" xmlns:a14="http://schemas.microsoft.com/office/drawing/2010/main" w="9525">
                   <a:solidFill>
                     <a:srgbClr val="000000"/>
                   </a:solidFill>
@@ -20309,7 +20141,7 @@
             </a:ln>
             <a:extLst>
               <a:ext uri="{91240B29-F687-4f45-9708-019B960494DF}">
-                <a14:hiddenLine xmlns:a14="http://schemas.microsoft.com/office/drawing/2010/main" xmlns:p14="http://schemas.microsoft.com/office/powerpoint/2010/main" xmlns:a16="http://schemas.microsoft.com/office/drawing/2014/main" xmlns="" w="9525">
+                <a14:hiddenLine xmlns="" xmlns:a16="http://schemas.microsoft.com/office/drawing/2014/main" xmlns:p14="http://schemas.microsoft.com/office/powerpoint/2010/main" xmlns:a14="http://schemas.microsoft.com/office/drawing/2010/main" w="9525">
                   <a:solidFill>
                     <a:srgbClr val="000000"/>
                   </a:solidFill>
@@ -20389,7 +20221,7 @@
             </a:ln>
             <a:extLst>
               <a:ext uri="{91240B29-F687-4f45-9708-019B960494DF}">
-                <a14:hiddenLine xmlns:a14="http://schemas.microsoft.com/office/drawing/2010/main" xmlns:p14="http://schemas.microsoft.com/office/powerpoint/2010/main" xmlns:a16="http://schemas.microsoft.com/office/drawing/2014/main" xmlns="" w="9525">
+                <a14:hiddenLine xmlns="" xmlns:a16="http://schemas.microsoft.com/office/drawing/2014/main" xmlns:p14="http://schemas.microsoft.com/office/powerpoint/2010/main" xmlns:a14="http://schemas.microsoft.com/office/drawing/2010/main" w="9525">
                   <a:solidFill>
                     <a:srgbClr val="000000"/>
                   </a:solidFill>
@@ -20494,7 +20326,7 @@
             </a:ln>
             <a:extLst>
               <a:ext uri="{91240B29-F687-4f45-9708-019B960494DF}">
-                <a14:hiddenLine xmlns:a14="http://schemas.microsoft.com/office/drawing/2010/main" xmlns:p14="http://schemas.microsoft.com/office/powerpoint/2010/main" xmlns:a16="http://schemas.microsoft.com/office/drawing/2014/main" xmlns="" w="9525">
+                <a14:hiddenLine xmlns="" xmlns:a16="http://schemas.microsoft.com/office/drawing/2014/main" xmlns:p14="http://schemas.microsoft.com/office/powerpoint/2010/main" xmlns:a14="http://schemas.microsoft.com/office/drawing/2010/main" w="9525">
                   <a:solidFill>
                     <a:srgbClr val="000000"/>
                   </a:solidFill>
@@ -20571,7 +20403,7 @@
             </a:ln>
             <a:extLst>
               <a:ext uri="{91240B29-F687-4f45-9708-019B960494DF}">
-                <a14:hiddenLine xmlns:a14="http://schemas.microsoft.com/office/drawing/2010/main" xmlns:p14="http://schemas.microsoft.com/office/powerpoint/2010/main" xmlns:a16="http://schemas.microsoft.com/office/drawing/2014/main" xmlns="" w="9525">
+                <a14:hiddenLine xmlns="" xmlns:a16="http://schemas.microsoft.com/office/drawing/2014/main" xmlns:p14="http://schemas.microsoft.com/office/powerpoint/2010/main" xmlns:a14="http://schemas.microsoft.com/office/drawing/2010/main" w="9525">
                   <a:solidFill>
                     <a:srgbClr val="000000"/>
                   </a:solidFill>
@@ -20676,7 +20508,7 @@
             </a:ln>
             <a:extLst>
               <a:ext uri="{91240B29-F687-4f45-9708-019B960494DF}">
-                <a14:hiddenLine xmlns:a14="http://schemas.microsoft.com/office/drawing/2010/main" xmlns:p14="http://schemas.microsoft.com/office/powerpoint/2010/main" xmlns:a16="http://schemas.microsoft.com/office/drawing/2014/main" xmlns="" w="9525">
+                <a14:hiddenLine xmlns="" xmlns:a16="http://schemas.microsoft.com/office/drawing/2014/main" xmlns:p14="http://schemas.microsoft.com/office/powerpoint/2010/main" xmlns:a14="http://schemas.microsoft.com/office/drawing/2010/main" w="9525">
                   <a:solidFill>
                     <a:srgbClr val="000000"/>
                   </a:solidFill>
@@ -20781,7 +20613,7 @@
             </a:ln>
             <a:extLst>
               <a:ext uri="{91240B29-F687-4f45-9708-019B960494DF}">
-                <a14:hiddenLine xmlns:a14="http://schemas.microsoft.com/office/drawing/2010/main" xmlns:p14="http://schemas.microsoft.com/office/powerpoint/2010/main" xmlns:a16="http://schemas.microsoft.com/office/drawing/2014/main" xmlns="" w="9525">
+                <a14:hiddenLine xmlns="" xmlns:a16="http://schemas.microsoft.com/office/drawing/2014/main" xmlns:p14="http://schemas.microsoft.com/office/powerpoint/2010/main" xmlns:a14="http://schemas.microsoft.com/office/drawing/2010/main" w="9525">
                   <a:solidFill>
                     <a:srgbClr val="000000"/>
                   </a:solidFill>
@@ -20861,7 +20693,7 @@
             </a:ln>
             <a:extLst>
               <a:ext uri="{91240B29-F687-4f45-9708-019B960494DF}">
-                <a14:hiddenLine xmlns:a14="http://schemas.microsoft.com/office/drawing/2010/main" xmlns:p14="http://schemas.microsoft.com/office/powerpoint/2010/main" xmlns:a16="http://schemas.microsoft.com/office/drawing/2014/main" xmlns="" w="9525">
+                <a14:hiddenLine xmlns="" xmlns:a16="http://schemas.microsoft.com/office/drawing/2014/main" xmlns:p14="http://schemas.microsoft.com/office/powerpoint/2010/main" xmlns:a14="http://schemas.microsoft.com/office/drawing/2010/main" w="9525">
                   <a:solidFill>
                     <a:srgbClr val="000000"/>
                   </a:solidFill>
@@ -20938,7 +20770,7 @@
             </a:ln>
             <a:extLst>
               <a:ext uri="{91240B29-F687-4f45-9708-019B960494DF}">
-                <a14:hiddenLine xmlns:a14="http://schemas.microsoft.com/office/drawing/2010/main" xmlns:p14="http://schemas.microsoft.com/office/powerpoint/2010/main" xmlns:a16="http://schemas.microsoft.com/office/drawing/2014/main" xmlns="" w="9525">
+                <a14:hiddenLine xmlns="" xmlns:a16="http://schemas.microsoft.com/office/drawing/2014/main" xmlns:p14="http://schemas.microsoft.com/office/powerpoint/2010/main" xmlns:a14="http://schemas.microsoft.com/office/drawing/2010/main" w="9525">
                   <a:solidFill>
                     <a:srgbClr val="000000"/>
                   </a:solidFill>
@@ -21043,7 +20875,7 @@
             </a:ln>
             <a:extLst>
               <a:ext uri="{91240B29-F687-4f45-9708-019B960494DF}">
-                <a14:hiddenLine xmlns:a14="http://schemas.microsoft.com/office/drawing/2010/main" xmlns:p14="http://schemas.microsoft.com/office/powerpoint/2010/main" xmlns:a16="http://schemas.microsoft.com/office/drawing/2014/main" xmlns="" w="9525">
+                <a14:hiddenLine xmlns="" xmlns:a16="http://schemas.microsoft.com/office/drawing/2014/main" xmlns:p14="http://schemas.microsoft.com/office/powerpoint/2010/main" xmlns:a14="http://schemas.microsoft.com/office/drawing/2010/main" w="9525">
                   <a:solidFill>
                     <a:srgbClr val="000000"/>
                   </a:solidFill>
@@ -21148,7 +20980,7 @@
             </a:ln>
             <a:extLst>
               <a:ext uri="{91240B29-F687-4f45-9708-019B960494DF}">
-                <a14:hiddenLine xmlns:a14="http://schemas.microsoft.com/office/drawing/2010/main" xmlns:p14="http://schemas.microsoft.com/office/powerpoint/2010/main" xmlns:a16="http://schemas.microsoft.com/office/drawing/2014/main" xmlns="" w="9525">
+                <a14:hiddenLine xmlns="" xmlns:a16="http://schemas.microsoft.com/office/drawing/2014/main" xmlns:p14="http://schemas.microsoft.com/office/powerpoint/2010/main" xmlns:a14="http://schemas.microsoft.com/office/drawing/2010/main" w="9525">
                   <a:solidFill>
                     <a:srgbClr val="000000"/>
                   </a:solidFill>
@@ -21225,7 +21057,7 @@
             </a:ln>
             <a:extLst>
               <a:ext uri="{91240B29-F687-4f45-9708-019B960494DF}">
-                <a14:hiddenLine xmlns:a14="http://schemas.microsoft.com/office/drawing/2010/main" xmlns:p14="http://schemas.microsoft.com/office/powerpoint/2010/main" xmlns:a16="http://schemas.microsoft.com/office/drawing/2014/main" xmlns="" w="9525">
+                <a14:hiddenLine xmlns="" xmlns:a16="http://schemas.microsoft.com/office/drawing/2014/main" xmlns:p14="http://schemas.microsoft.com/office/powerpoint/2010/main" xmlns:a14="http://schemas.microsoft.com/office/drawing/2010/main" w="9525">
                   <a:solidFill>
                     <a:srgbClr val="000000"/>
                   </a:solidFill>
@@ -21360,7 +21192,7 @@
             </a:ln>
             <a:extLst>
               <a:ext uri="{91240B29-F687-4f45-9708-019B960494DF}">
-                <a14:hiddenLine xmlns:a14="http://schemas.microsoft.com/office/drawing/2010/main" xmlns:p14="http://schemas.microsoft.com/office/powerpoint/2010/main" xmlns:a16="http://schemas.microsoft.com/office/drawing/2014/main" xmlns="" w="9525">
+                <a14:hiddenLine xmlns="" xmlns:a16="http://schemas.microsoft.com/office/drawing/2014/main" xmlns:p14="http://schemas.microsoft.com/office/powerpoint/2010/main" xmlns:a14="http://schemas.microsoft.com/office/drawing/2010/main" w="9525">
                   <a:solidFill>
                     <a:srgbClr val="000000"/>
                   </a:solidFill>
@@ -21443,7 +21275,7 @@
             </a:ln>
             <a:extLst>
               <a:ext uri="{91240B29-F687-4f45-9708-019B960494DF}">
-                <a14:hiddenLine xmlns:a14="http://schemas.microsoft.com/office/drawing/2010/main" xmlns:p14="http://schemas.microsoft.com/office/powerpoint/2010/main" xmlns:a16="http://schemas.microsoft.com/office/drawing/2014/main" xmlns="" w="9525">
+                <a14:hiddenLine xmlns="" xmlns:a16="http://schemas.microsoft.com/office/drawing/2014/main" xmlns:p14="http://schemas.microsoft.com/office/powerpoint/2010/main" xmlns:a14="http://schemas.microsoft.com/office/drawing/2010/main" w="9525">
                   <a:solidFill>
                     <a:srgbClr val="000000"/>
                   </a:solidFill>
@@ -21548,7 +21380,7 @@
             </a:ln>
             <a:extLst>
               <a:ext uri="{91240B29-F687-4f45-9708-019B960494DF}">
-                <a14:hiddenLine xmlns:a14="http://schemas.microsoft.com/office/drawing/2010/main" xmlns:p14="http://schemas.microsoft.com/office/powerpoint/2010/main" xmlns:a16="http://schemas.microsoft.com/office/drawing/2014/main" xmlns="" w="9525">
+                <a14:hiddenLine xmlns="" xmlns:a16="http://schemas.microsoft.com/office/drawing/2014/main" xmlns:p14="http://schemas.microsoft.com/office/powerpoint/2010/main" xmlns:a14="http://schemas.microsoft.com/office/drawing/2010/main" w="9525">
                   <a:solidFill>
                     <a:srgbClr val="000000"/>
                   </a:solidFill>
@@ -21705,7 +21537,7 @@
             <a:noFill/>
             <a:extLst>
               <a:ext uri="{909E8E84-426E-40dd-AFC4-6F175D3DCCD1}">
-                <a14:hiddenFill xmlns:a14="http://schemas.microsoft.com/office/drawing/2010/main" xmlns:mc="http://schemas.openxmlformats.org/markup-compatibility/2006" xmlns:p14="http://schemas.microsoft.com/office/powerpoint/2010/main" xmlns:a16="http://schemas.microsoft.com/office/drawing/2014/main" xmlns="">
+                <a14:hiddenFill xmlns="" xmlns:a16="http://schemas.microsoft.com/office/drawing/2014/main" xmlns:p14="http://schemas.microsoft.com/office/powerpoint/2010/main" xmlns:mc="http://schemas.openxmlformats.org/markup-compatibility/2006" xmlns:a14="http://schemas.microsoft.com/office/drawing/2010/main">
                   <a:solidFill>
                     <a:srgbClr val="FFFFFF"/>
                   </a:solidFill>
@@ -21833,7 +21665,7 @@
             </a:ln>
             <a:extLst>
               <a:ext uri="{91240B29-F687-4f45-9708-019B960494DF}">
-                <a14:hiddenLine xmlns:a14="http://schemas.microsoft.com/office/drawing/2010/main" xmlns:mc="http://schemas.openxmlformats.org/markup-compatibility/2006" xmlns:p14="http://schemas.microsoft.com/office/powerpoint/2010/main" xmlns:a16="http://schemas.microsoft.com/office/drawing/2014/main" xmlns="" w="9525">
+                <a14:hiddenLine xmlns="" xmlns:a16="http://schemas.microsoft.com/office/drawing/2014/main" xmlns:p14="http://schemas.microsoft.com/office/powerpoint/2010/main" xmlns:mc="http://schemas.openxmlformats.org/markup-compatibility/2006" xmlns:a14="http://schemas.microsoft.com/office/drawing/2010/main" w="9525">
                   <a:solidFill>
                     <a:srgbClr val="000000"/>
                   </a:solidFill>
@@ -21938,7 +21770,7 @@
             </a:ln>
             <a:extLst>
               <a:ext uri="{91240B29-F687-4f45-9708-019B960494DF}">
-                <a14:hiddenLine xmlns:a14="http://schemas.microsoft.com/office/drawing/2010/main" xmlns:mc="http://schemas.openxmlformats.org/markup-compatibility/2006" xmlns:p14="http://schemas.microsoft.com/office/powerpoint/2010/main" xmlns:a16="http://schemas.microsoft.com/office/drawing/2014/main" xmlns="" w="9525">
+                <a14:hiddenLine xmlns="" xmlns:a16="http://schemas.microsoft.com/office/drawing/2014/main" xmlns:p14="http://schemas.microsoft.com/office/powerpoint/2010/main" xmlns:mc="http://schemas.openxmlformats.org/markup-compatibility/2006" xmlns:a14="http://schemas.microsoft.com/office/drawing/2010/main" w="9525">
                   <a:solidFill>
                     <a:srgbClr val="000000"/>
                   </a:solidFill>
@@ -22043,7 +21875,7 @@
             </a:ln>
             <a:extLst>
               <a:ext uri="{91240B29-F687-4f45-9708-019B960494DF}">
-                <a14:hiddenLine xmlns:a14="http://schemas.microsoft.com/office/drawing/2010/main" xmlns:mc="http://schemas.openxmlformats.org/markup-compatibility/2006" xmlns:p14="http://schemas.microsoft.com/office/powerpoint/2010/main" xmlns:a16="http://schemas.microsoft.com/office/drawing/2014/main" xmlns="" w="9525">
+                <a14:hiddenLine xmlns="" xmlns:a16="http://schemas.microsoft.com/office/drawing/2014/main" xmlns:p14="http://schemas.microsoft.com/office/powerpoint/2010/main" xmlns:mc="http://schemas.openxmlformats.org/markup-compatibility/2006" xmlns:a14="http://schemas.microsoft.com/office/drawing/2010/main" w="9525">
                   <a:solidFill>
                     <a:srgbClr val="000000"/>
                   </a:solidFill>
@@ -22120,7 +21952,7 @@
             </a:ln>
             <a:extLst>
               <a:ext uri="{91240B29-F687-4f45-9708-019B960494DF}">
-                <a14:hiddenLine xmlns:a14="http://schemas.microsoft.com/office/drawing/2010/main" xmlns:mc="http://schemas.openxmlformats.org/markup-compatibility/2006" xmlns:p14="http://schemas.microsoft.com/office/powerpoint/2010/main" xmlns:a16="http://schemas.microsoft.com/office/drawing/2014/main" xmlns="" w="9525">
+                <a14:hiddenLine xmlns="" xmlns:a16="http://schemas.microsoft.com/office/drawing/2014/main" xmlns:p14="http://schemas.microsoft.com/office/powerpoint/2010/main" xmlns:mc="http://schemas.openxmlformats.org/markup-compatibility/2006" xmlns:a14="http://schemas.microsoft.com/office/drawing/2010/main" w="9525">
                   <a:solidFill>
                     <a:srgbClr val="000000"/>
                   </a:solidFill>
@@ -22225,7 +22057,7 @@
             </a:ln>
             <a:extLst>
               <a:ext uri="{91240B29-F687-4f45-9708-019B960494DF}">
-                <a14:hiddenLine xmlns:a14="http://schemas.microsoft.com/office/drawing/2010/main" xmlns:mc="http://schemas.openxmlformats.org/markup-compatibility/2006" xmlns:p14="http://schemas.microsoft.com/office/powerpoint/2010/main" xmlns:a16="http://schemas.microsoft.com/office/drawing/2014/main" xmlns="" w="9525">
+                <a14:hiddenLine xmlns="" xmlns:a16="http://schemas.microsoft.com/office/drawing/2014/main" xmlns:p14="http://schemas.microsoft.com/office/powerpoint/2010/main" xmlns:mc="http://schemas.openxmlformats.org/markup-compatibility/2006" xmlns:a14="http://schemas.microsoft.com/office/drawing/2010/main" w="9525">
                   <a:solidFill>
                     <a:srgbClr val="000000"/>
                   </a:solidFill>
@@ -22302,7 +22134,7 @@
             </a:ln>
             <a:extLst>
               <a:ext uri="{91240B29-F687-4f45-9708-019B960494DF}">
-                <a14:hiddenLine xmlns:a14="http://schemas.microsoft.com/office/drawing/2010/main" xmlns:mc="http://schemas.openxmlformats.org/markup-compatibility/2006" xmlns:p14="http://schemas.microsoft.com/office/powerpoint/2010/main" xmlns:a16="http://schemas.microsoft.com/office/drawing/2014/main" xmlns="" w="9525">
+                <a14:hiddenLine xmlns="" xmlns:a16="http://schemas.microsoft.com/office/drawing/2014/main" xmlns:p14="http://schemas.microsoft.com/office/powerpoint/2010/main" xmlns:mc="http://schemas.openxmlformats.org/markup-compatibility/2006" xmlns:a14="http://schemas.microsoft.com/office/drawing/2010/main" w="9525">
                   <a:solidFill>
                     <a:srgbClr val="000000"/>
                   </a:solidFill>
@@ -22379,7 +22211,7 @@
             </a:ln>
             <a:extLst>
               <a:ext uri="{91240B29-F687-4f45-9708-019B960494DF}">
-                <a14:hiddenLine xmlns:a14="http://schemas.microsoft.com/office/drawing/2010/main" xmlns:mc="http://schemas.openxmlformats.org/markup-compatibility/2006" xmlns:p14="http://schemas.microsoft.com/office/powerpoint/2010/main" xmlns:a16="http://schemas.microsoft.com/office/drawing/2014/main" xmlns="" w="9525">
+                <a14:hiddenLine xmlns="" xmlns:a16="http://schemas.microsoft.com/office/drawing/2014/main" xmlns:p14="http://schemas.microsoft.com/office/powerpoint/2010/main" xmlns:mc="http://schemas.openxmlformats.org/markup-compatibility/2006" xmlns:a14="http://schemas.microsoft.com/office/drawing/2010/main" w="9525">
                   <a:solidFill>
                     <a:srgbClr val="000000"/>
                   </a:solidFill>
@@ -22484,7 +22316,7 @@
             </a:ln>
             <a:extLst>
               <a:ext uri="{91240B29-F687-4f45-9708-019B960494DF}">
-                <a14:hiddenLine xmlns:a14="http://schemas.microsoft.com/office/drawing/2010/main" xmlns:mc="http://schemas.openxmlformats.org/markup-compatibility/2006" xmlns:p14="http://schemas.microsoft.com/office/powerpoint/2010/main" xmlns:a16="http://schemas.microsoft.com/office/drawing/2014/main" xmlns="" w="9525">
+                <a14:hiddenLine xmlns="" xmlns:a16="http://schemas.microsoft.com/office/drawing/2014/main" xmlns:p14="http://schemas.microsoft.com/office/powerpoint/2010/main" xmlns:mc="http://schemas.openxmlformats.org/markup-compatibility/2006" xmlns:a14="http://schemas.microsoft.com/office/drawing/2010/main" w="9525">
                   <a:solidFill>
                     <a:srgbClr val="000000"/>
                   </a:solidFill>
@@ -22589,7 +22421,7 @@
             </a:ln>
             <a:extLst>
               <a:ext uri="{91240B29-F687-4f45-9708-019B960494DF}">
-                <a14:hiddenLine xmlns:a14="http://schemas.microsoft.com/office/drawing/2010/main" xmlns:mc="http://schemas.openxmlformats.org/markup-compatibility/2006" xmlns:p14="http://schemas.microsoft.com/office/powerpoint/2010/main" xmlns:a16="http://schemas.microsoft.com/office/drawing/2014/main" xmlns="" w="9525">
+                <a14:hiddenLine xmlns="" xmlns:a16="http://schemas.microsoft.com/office/drawing/2014/main" xmlns:p14="http://schemas.microsoft.com/office/powerpoint/2010/main" xmlns:mc="http://schemas.openxmlformats.org/markup-compatibility/2006" xmlns:a14="http://schemas.microsoft.com/office/drawing/2010/main" w="9525">
                   <a:solidFill>
                     <a:srgbClr val="000000"/>
                   </a:solidFill>
@@ -22666,7 +22498,7 @@
             </a:ln>
             <a:extLst>
               <a:ext uri="{91240B29-F687-4f45-9708-019B960494DF}">
-                <a14:hiddenLine xmlns:a14="http://schemas.microsoft.com/office/drawing/2010/main" xmlns:mc="http://schemas.openxmlformats.org/markup-compatibility/2006" xmlns:p14="http://schemas.microsoft.com/office/powerpoint/2010/main" xmlns:a16="http://schemas.microsoft.com/office/drawing/2014/main" xmlns="" w="9525">
+                <a14:hiddenLine xmlns="" xmlns:a16="http://schemas.microsoft.com/office/drawing/2014/main" xmlns:p14="http://schemas.microsoft.com/office/powerpoint/2010/main" xmlns:mc="http://schemas.openxmlformats.org/markup-compatibility/2006" xmlns:a14="http://schemas.microsoft.com/office/drawing/2010/main" w="9525">
                   <a:solidFill>
                     <a:srgbClr val="000000"/>
                   </a:solidFill>
@@ -22791,7 +22623,7 @@
             </a:ln>
             <a:extLst>
               <a:ext uri="{91240B29-F687-4f45-9708-019B960494DF}">
-                <a14:hiddenLine xmlns:a14="http://schemas.microsoft.com/office/drawing/2010/main" xmlns:mc="http://schemas.openxmlformats.org/markup-compatibility/2006" xmlns:p14="http://schemas.microsoft.com/office/powerpoint/2010/main" xmlns:a16="http://schemas.microsoft.com/office/drawing/2014/main" xmlns="" w="9525">
+                <a14:hiddenLine xmlns="" xmlns:a16="http://schemas.microsoft.com/office/drawing/2014/main" xmlns:p14="http://schemas.microsoft.com/office/powerpoint/2010/main" xmlns:mc="http://schemas.openxmlformats.org/markup-compatibility/2006" xmlns:a14="http://schemas.microsoft.com/office/drawing/2010/main" w="9525">
                   <a:solidFill>
                     <a:srgbClr val="000000"/>
                   </a:solidFill>
@@ -22905,7 +22737,7 @@
             </a:ln>
             <a:extLst>
               <a:ext uri="{91240B29-F687-4f45-9708-019B960494DF}">
-                <a14:hiddenLine xmlns:a14="http://schemas.microsoft.com/office/drawing/2010/main" xmlns:mc="http://schemas.openxmlformats.org/markup-compatibility/2006" xmlns:p14="http://schemas.microsoft.com/office/powerpoint/2010/main" xmlns:a16="http://schemas.microsoft.com/office/drawing/2014/main" xmlns="" w="9525">
+                <a14:hiddenLine xmlns="" xmlns:a16="http://schemas.microsoft.com/office/drawing/2014/main" xmlns:p14="http://schemas.microsoft.com/office/powerpoint/2010/main" xmlns:mc="http://schemas.openxmlformats.org/markup-compatibility/2006" xmlns:a14="http://schemas.microsoft.com/office/drawing/2010/main" w="9525">
                   <a:solidFill>
                     <a:srgbClr val="000000"/>
                   </a:solidFill>
@@ -22982,7 +22814,7 @@
             </a:ln>
             <a:extLst>
               <a:ext uri="{91240B29-F687-4f45-9708-019B960494DF}">
-                <a14:hiddenLine xmlns:a14="http://schemas.microsoft.com/office/drawing/2010/main" xmlns:mc="http://schemas.openxmlformats.org/markup-compatibility/2006" xmlns:p14="http://schemas.microsoft.com/office/powerpoint/2010/main" xmlns:a16="http://schemas.microsoft.com/office/drawing/2014/main" xmlns="" w="9525">
+                <a14:hiddenLine xmlns="" xmlns:a16="http://schemas.microsoft.com/office/drawing/2014/main" xmlns:p14="http://schemas.microsoft.com/office/powerpoint/2010/main" xmlns:mc="http://schemas.openxmlformats.org/markup-compatibility/2006" xmlns:a14="http://schemas.microsoft.com/office/drawing/2010/main" w="9525">
                   <a:solidFill>
                     <a:srgbClr val="000000"/>
                   </a:solidFill>
@@ -23059,7 +22891,7 @@
             </a:ln>
             <a:extLst>
               <a:ext uri="{91240B29-F687-4f45-9708-019B960494DF}">
-                <a14:hiddenLine xmlns:a14="http://schemas.microsoft.com/office/drawing/2010/main" xmlns:mc="http://schemas.openxmlformats.org/markup-compatibility/2006" xmlns:p14="http://schemas.microsoft.com/office/powerpoint/2010/main" xmlns:a16="http://schemas.microsoft.com/office/drawing/2014/main" xmlns="" w="9525">
+                <a14:hiddenLine xmlns="" xmlns:a16="http://schemas.microsoft.com/office/drawing/2014/main" xmlns:p14="http://schemas.microsoft.com/office/powerpoint/2010/main" xmlns:mc="http://schemas.openxmlformats.org/markup-compatibility/2006" xmlns:a14="http://schemas.microsoft.com/office/drawing/2010/main" w="9525">
                   <a:solidFill>
                     <a:srgbClr val="000000"/>
                   </a:solidFill>
@@ -23164,7 +22996,7 @@
             </a:ln>
             <a:extLst>
               <a:ext uri="{91240B29-F687-4f45-9708-019B960494DF}">
-                <a14:hiddenLine xmlns:a14="http://schemas.microsoft.com/office/drawing/2010/main" xmlns:mc="http://schemas.openxmlformats.org/markup-compatibility/2006" xmlns:p14="http://schemas.microsoft.com/office/powerpoint/2010/main" xmlns:a16="http://schemas.microsoft.com/office/drawing/2014/main" xmlns="" w="9525">
+                <a14:hiddenLine xmlns="" xmlns:a16="http://schemas.microsoft.com/office/drawing/2014/main" xmlns:p14="http://schemas.microsoft.com/office/powerpoint/2010/main" xmlns:mc="http://schemas.openxmlformats.org/markup-compatibility/2006" xmlns:a14="http://schemas.microsoft.com/office/drawing/2010/main" w="9525">
                   <a:solidFill>
                     <a:srgbClr val="000000"/>
                   </a:solidFill>
@@ -23213,7 +23045,7 @@
             </a:ln>
             <a:extLst>
               <a:ext uri="{91240B29-F687-4f45-9708-019B960494DF}">
-                <a14:hiddenLine xmlns:a14="http://schemas.microsoft.com/office/drawing/2010/main" xmlns:mc="http://schemas.openxmlformats.org/markup-compatibility/2006" xmlns:p14="http://schemas.microsoft.com/office/powerpoint/2010/main" xmlns:a16="http://schemas.microsoft.com/office/drawing/2014/main" xmlns="" w="9525">
+                <a14:hiddenLine xmlns="" xmlns:a16="http://schemas.microsoft.com/office/drawing/2014/main" xmlns:p14="http://schemas.microsoft.com/office/powerpoint/2010/main" xmlns:mc="http://schemas.openxmlformats.org/markup-compatibility/2006" xmlns:a14="http://schemas.microsoft.com/office/drawing/2010/main" w="9525">
                   <a:solidFill>
                     <a:srgbClr val="000000"/>
                   </a:solidFill>
@@ -23293,7 +23125,7 @@
             </a:ln>
             <a:extLst>
               <a:ext uri="{91240B29-F687-4f45-9708-019B960494DF}">
-                <a14:hiddenLine xmlns:a14="http://schemas.microsoft.com/office/drawing/2010/main" xmlns:mc="http://schemas.openxmlformats.org/markup-compatibility/2006" xmlns:p14="http://schemas.microsoft.com/office/powerpoint/2010/main" xmlns:a16="http://schemas.microsoft.com/office/drawing/2014/main" xmlns="" w="9525">
+                <a14:hiddenLine xmlns="" xmlns:a16="http://schemas.microsoft.com/office/drawing/2014/main" xmlns:p14="http://schemas.microsoft.com/office/powerpoint/2010/main" xmlns:mc="http://schemas.openxmlformats.org/markup-compatibility/2006" xmlns:a14="http://schemas.microsoft.com/office/drawing/2010/main" w="9525">
                   <a:solidFill>
                     <a:srgbClr val="000000"/>
                   </a:solidFill>
@@ -23398,7 +23230,7 @@
             </a:ln>
             <a:extLst>
               <a:ext uri="{91240B29-F687-4f45-9708-019B960494DF}">
-                <a14:hiddenLine xmlns:a14="http://schemas.microsoft.com/office/drawing/2010/main" xmlns:mc="http://schemas.openxmlformats.org/markup-compatibility/2006" xmlns:p14="http://schemas.microsoft.com/office/powerpoint/2010/main" xmlns:a16="http://schemas.microsoft.com/office/drawing/2014/main" xmlns="" w="9525">
+                <a14:hiddenLine xmlns="" xmlns:a16="http://schemas.microsoft.com/office/drawing/2014/main" xmlns:p14="http://schemas.microsoft.com/office/powerpoint/2010/main" xmlns:mc="http://schemas.openxmlformats.org/markup-compatibility/2006" xmlns:a14="http://schemas.microsoft.com/office/drawing/2010/main" w="9525">
                   <a:solidFill>
                     <a:srgbClr val="000000"/>
                   </a:solidFill>
@@ -23475,7 +23307,7 @@
             </a:ln>
             <a:extLst>
               <a:ext uri="{91240B29-F687-4f45-9708-019B960494DF}">
-                <a14:hiddenLine xmlns:a14="http://schemas.microsoft.com/office/drawing/2010/main" xmlns:mc="http://schemas.openxmlformats.org/markup-compatibility/2006" xmlns:p14="http://schemas.microsoft.com/office/powerpoint/2010/main" xmlns:a16="http://schemas.microsoft.com/office/drawing/2014/main" xmlns="" w="9525">
+                <a14:hiddenLine xmlns="" xmlns:a16="http://schemas.microsoft.com/office/drawing/2014/main" xmlns:p14="http://schemas.microsoft.com/office/powerpoint/2010/main" xmlns:mc="http://schemas.openxmlformats.org/markup-compatibility/2006" xmlns:a14="http://schemas.microsoft.com/office/drawing/2010/main" w="9525">
                   <a:solidFill>
                     <a:srgbClr val="000000"/>
                   </a:solidFill>
@@ -23580,7 +23412,7 @@
             </a:ln>
             <a:extLst>
               <a:ext uri="{91240B29-F687-4f45-9708-019B960494DF}">
-                <a14:hiddenLine xmlns:a14="http://schemas.microsoft.com/office/drawing/2010/main" xmlns:mc="http://schemas.openxmlformats.org/markup-compatibility/2006" xmlns:p14="http://schemas.microsoft.com/office/powerpoint/2010/main" xmlns:a16="http://schemas.microsoft.com/office/drawing/2014/main" xmlns="" w="9525">
+                <a14:hiddenLine xmlns="" xmlns:a16="http://schemas.microsoft.com/office/drawing/2014/main" xmlns:p14="http://schemas.microsoft.com/office/powerpoint/2010/main" xmlns:mc="http://schemas.openxmlformats.org/markup-compatibility/2006" xmlns:a14="http://schemas.microsoft.com/office/drawing/2010/main" w="9525">
                   <a:solidFill>
                     <a:srgbClr val="000000"/>
                   </a:solidFill>
@@ -23660,7 +23492,7 @@
             </a:ln>
             <a:extLst>
               <a:ext uri="{91240B29-F687-4f45-9708-019B960494DF}">
-                <a14:hiddenLine xmlns:a14="http://schemas.microsoft.com/office/drawing/2010/main" xmlns:mc="http://schemas.openxmlformats.org/markup-compatibility/2006" xmlns:p14="http://schemas.microsoft.com/office/powerpoint/2010/main" xmlns:a16="http://schemas.microsoft.com/office/drawing/2014/main" xmlns="" w="9525">
+                <a14:hiddenLine xmlns="" xmlns:a16="http://schemas.microsoft.com/office/drawing/2014/main" xmlns:p14="http://schemas.microsoft.com/office/powerpoint/2010/main" xmlns:mc="http://schemas.openxmlformats.org/markup-compatibility/2006" xmlns:a14="http://schemas.microsoft.com/office/drawing/2010/main" w="9525">
                   <a:solidFill>
                     <a:srgbClr val="000000"/>
                   </a:solidFill>
@@ -23737,7 +23569,7 @@
             </a:ln>
             <a:extLst>
               <a:ext uri="{91240B29-F687-4f45-9708-019B960494DF}">
-                <a14:hiddenLine xmlns:a14="http://schemas.microsoft.com/office/drawing/2010/main" xmlns:mc="http://schemas.openxmlformats.org/markup-compatibility/2006" xmlns:p14="http://schemas.microsoft.com/office/powerpoint/2010/main" xmlns:a16="http://schemas.microsoft.com/office/drawing/2014/main" xmlns="" w="9525">
+                <a14:hiddenLine xmlns="" xmlns:a16="http://schemas.microsoft.com/office/drawing/2014/main" xmlns:p14="http://schemas.microsoft.com/office/powerpoint/2010/main" xmlns:mc="http://schemas.openxmlformats.org/markup-compatibility/2006" xmlns:a14="http://schemas.microsoft.com/office/drawing/2010/main" w="9525">
                   <a:solidFill>
                     <a:srgbClr val="000000"/>
                   </a:solidFill>
@@ -23842,7 +23674,7 @@
             </a:ln>
             <a:extLst>
               <a:ext uri="{91240B29-F687-4f45-9708-019B960494DF}">
-                <a14:hiddenLine xmlns:a14="http://schemas.microsoft.com/office/drawing/2010/main" xmlns:mc="http://schemas.openxmlformats.org/markup-compatibility/2006" xmlns:p14="http://schemas.microsoft.com/office/powerpoint/2010/main" xmlns:a16="http://schemas.microsoft.com/office/drawing/2014/main" xmlns="" w="9525">
+                <a14:hiddenLine xmlns="" xmlns:a16="http://schemas.microsoft.com/office/drawing/2014/main" xmlns:p14="http://schemas.microsoft.com/office/powerpoint/2010/main" xmlns:mc="http://schemas.openxmlformats.org/markup-compatibility/2006" xmlns:a14="http://schemas.microsoft.com/office/drawing/2010/main" w="9525">
                   <a:solidFill>
                     <a:srgbClr val="000000"/>
                   </a:solidFill>
@@ -23947,7 +23779,7 @@
             </a:ln>
             <a:extLst>
               <a:ext uri="{91240B29-F687-4f45-9708-019B960494DF}">
-                <a14:hiddenLine xmlns:a14="http://schemas.microsoft.com/office/drawing/2010/main" xmlns:mc="http://schemas.openxmlformats.org/markup-compatibility/2006" xmlns:p14="http://schemas.microsoft.com/office/powerpoint/2010/main" xmlns:a16="http://schemas.microsoft.com/office/drawing/2014/main" xmlns="" w="9525">
+                <a14:hiddenLine xmlns="" xmlns:a16="http://schemas.microsoft.com/office/drawing/2014/main" xmlns:p14="http://schemas.microsoft.com/office/powerpoint/2010/main" xmlns:mc="http://schemas.openxmlformats.org/markup-compatibility/2006" xmlns:a14="http://schemas.microsoft.com/office/drawing/2010/main" w="9525">
                   <a:solidFill>
                     <a:srgbClr val="000000"/>
                   </a:solidFill>
@@ -24027,7 +23859,7 @@
             </a:ln>
             <a:extLst>
               <a:ext uri="{91240B29-F687-4f45-9708-019B960494DF}">
-                <a14:hiddenLine xmlns:a14="http://schemas.microsoft.com/office/drawing/2010/main" xmlns:mc="http://schemas.openxmlformats.org/markup-compatibility/2006" xmlns:p14="http://schemas.microsoft.com/office/powerpoint/2010/main" xmlns:a16="http://schemas.microsoft.com/office/drawing/2014/main" xmlns="" w="9525">
+                <a14:hiddenLine xmlns="" xmlns:a16="http://schemas.microsoft.com/office/drawing/2014/main" xmlns:p14="http://schemas.microsoft.com/office/powerpoint/2010/main" xmlns:mc="http://schemas.openxmlformats.org/markup-compatibility/2006" xmlns:a14="http://schemas.microsoft.com/office/drawing/2010/main" w="9525">
                   <a:solidFill>
                     <a:srgbClr val="000000"/>
                   </a:solidFill>
@@ -24162,7 +23994,7 @@
             </a:ln>
             <a:extLst>
               <a:ext uri="{91240B29-F687-4f45-9708-019B960494DF}">
-                <a14:hiddenLine xmlns:a14="http://schemas.microsoft.com/office/drawing/2010/main" xmlns:mc="http://schemas.openxmlformats.org/markup-compatibility/2006" xmlns:p14="http://schemas.microsoft.com/office/powerpoint/2010/main" xmlns:a16="http://schemas.microsoft.com/office/drawing/2014/main" xmlns="" w="9525">
+                <a14:hiddenLine xmlns="" xmlns:a16="http://schemas.microsoft.com/office/drawing/2014/main" xmlns:p14="http://schemas.microsoft.com/office/powerpoint/2010/main" xmlns:mc="http://schemas.openxmlformats.org/markup-compatibility/2006" xmlns:a14="http://schemas.microsoft.com/office/drawing/2010/main" w="9525">
                   <a:solidFill>
                     <a:srgbClr val="000000"/>
                   </a:solidFill>
@@ -24633,7 +24465,7 @@
             </a:ln>
             <a:extLst>
               <a:ext uri="{91240B29-F687-4f45-9708-019B960494DF}">
-                <a14:hiddenLine xmlns:a14="http://schemas.microsoft.com/office/drawing/2010/main" xmlns:mc="http://schemas.openxmlformats.org/markup-compatibility/2006" xmlns:p14="http://schemas.microsoft.com/office/powerpoint/2010/main" xmlns:a16="http://schemas.microsoft.com/office/drawing/2014/main" xmlns="" w="9525">
+                <a14:hiddenLine xmlns="" xmlns:a16="http://schemas.microsoft.com/office/drawing/2014/main" xmlns:p14="http://schemas.microsoft.com/office/powerpoint/2010/main" xmlns:mc="http://schemas.openxmlformats.org/markup-compatibility/2006" xmlns:a14="http://schemas.microsoft.com/office/drawing/2010/main" w="9525">
                   <a:solidFill>
                     <a:srgbClr val="000000"/>
                   </a:solidFill>
@@ -24763,7 +24595,7 @@
             </a:ln>
             <a:extLst>
               <a:ext uri="{91240B29-F687-4f45-9708-019B960494DF}">
-                <a14:hiddenLine xmlns:a14="http://schemas.microsoft.com/office/drawing/2010/main" xmlns:mc="http://schemas.openxmlformats.org/markup-compatibility/2006" xmlns:p14="http://schemas.microsoft.com/office/powerpoint/2010/main" xmlns:a16="http://schemas.microsoft.com/office/drawing/2014/main" xmlns="" w="9525">
+                <a14:hiddenLine xmlns="" xmlns:a16="http://schemas.microsoft.com/office/drawing/2014/main" xmlns:p14="http://schemas.microsoft.com/office/powerpoint/2010/main" xmlns:mc="http://schemas.openxmlformats.org/markup-compatibility/2006" xmlns:a14="http://schemas.microsoft.com/office/drawing/2010/main" w="9525">
                   <a:solidFill>
                     <a:srgbClr val="000000"/>
                   </a:solidFill>
@@ -24868,7 +24700,7 @@
             </a:ln>
             <a:extLst>
               <a:ext uri="{91240B29-F687-4f45-9708-019B960494DF}">
-                <a14:hiddenLine xmlns:a14="http://schemas.microsoft.com/office/drawing/2010/main" xmlns:mc="http://schemas.openxmlformats.org/markup-compatibility/2006" xmlns:p14="http://schemas.microsoft.com/office/powerpoint/2010/main" xmlns:a16="http://schemas.microsoft.com/office/drawing/2014/main" xmlns="" w="9525">
+                <a14:hiddenLine xmlns="" xmlns:a16="http://schemas.microsoft.com/office/drawing/2014/main" xmlns:p14="http://schemas.microsoft.com/office/powerpoint/2010/main" xmlns:mc="http://schemas.openxmlformats.org/markup-compatibility/2006" xmlns:a14="http://schemas.microsoft.com/office/drawing/2010/main" w="9525">
                   <a:solidFill>
                     <a:srgbClr val="000000"/>
                   </a:solidFill>
@@ -24948,7 +24780,7 @@
             </a:ln>
             <a:extLst>
               <a:ext uri="{91240B29-F687-4f45-9708-019B960494DF}">
-                <a14:hiddenLine xmlns:a14="http://schemas.microsoft.com/office/drawing/2010/main" xmlns:mc="http://schemas.openxmlformats.org/markup-compatibility/2006" xmlns:p14="http://schemas.microsoft.com/office/powerpoint/2010/main" xmlns:a16="http://schemas.microsoft.com/office/drawing/2014/main" xmlns="" w="9525">
+                <a14:hiddenLine xmlns="" xmlns:a16="http://schemas.microsoft.com/office/drawing/2014/main" xmlns:p14="http://schemas.microsoft.com/office/powerpoint/2010/main" xmlns:mc="http://schemas.openxmlformats.org/markup-compatibility/2006" xmlns:a14="http://schemas.microsoft.com/office/drawing/2010/main" w="9525">
                   <a:solidFill>
                     <a:srgbClr val="000000"/>
                   </a:solidFill>
@@ -25053,7 +24885,7 @@
             </a:ln>
             <a:extLst>
               <a:ext uri="{91240B29-F687-4f45-9708-019B960494DF}">
-                <a14:hiddenLine xmlns:a14="http://schemas.microsoft.com/office/drawing/2010/main" xmlns:mc="http://schemas.openxmlformats.org/markup-compatibility/2006" xmlns:p14="http://schemas.microsoft.com/office/powerpoint/2010/main" xmlns:a16="http://schemas.microsoft.com/office/drawing/2014/main" xmlns="" w="9525">
+                <a14:hiddenLine xmlns="" xmlns:a16="http://schemas.microsoft.com/office/drawing/2014/main" xmlns:p14="http://schemas.microsoft.com/office/powerpoint/2010/main" xmlns:mc="http://schemas.openxmlformats.org/markup-compatibility/2006" xmlns:a14="http://schemas.microsoft.com/office/drawing/2010/main" w="9525">
                   <a:solidFill>
                     <a:srgbClr val="000000"/>
                   </a:solidFill>
@@ -25136,7 +24968,7 @@
             </a:ln>
             <a:extLst>
               <a:ext uri="{91240B29-F687-4f45-9708-019B960494DF}">
-                <a14:hiddenLine xmlns:a14="http://schemas.microsoft.com/office/drawing/2010/main" xmlns:mc="http://schemas.openxmlformats.org/markup-compatibility/2006" xmlns:p14="http://schemas.microsoft.com/office/powerpoint/2010/main" xmlns:a16="http://schemas.microsoft.com/office/drawing/2014/main" xmlns="" w="9525">
+                <a14:hiddenLine xmlns="" xmlns:a16="http://schemas.microsoft.com/office/drawing/2014/main" xmlns:p14="http://schemas.microsoft.com/office/powerpoint/2010/main" xmlns:mc="http://schemas.openxmlformats.org/markup-compatibility/2006" xmlns:a14="http://schemas.microsoft.com/office/drawing/2010/main" w="9525">
                   <a:solidFill>
                     <a:srgbClr val="000000"/>
                   </a:solidFill>
@@ -25241,7 +25073,7 @@
             </a:ln>
             <a:extLst>
               <a:ext uri="{91240B29-F687-4f45-9708-019B960494DF}">
-                <a14:hiddenLine xmlns:a14="http://schemas.microsoft.com/office/drawing/2010/main" xmlns:mc="http://schemas.openxmlformats.org/markup-compatibility/2006" xmlns:p14="http://schemas.microsoft.com/office/powerpoint/2010/main" xmlns:a16="http://schemas.microsoft.com/office/drawing/2014/main" xmlns="" w="9525">
+                <a14:hiddenLine xmlns="" xmlns:a16="http://schemas.microsoft.com/office/drawing/2014/main" xmlns:p14="http://schemas.microsoft.com/office/powerpoint/2010/main" xmlns:mc="http://schemas.openxmlformats.org/markup-compatibility/2006" xmlns:a14="http://schemas.microsoft.com/office/drawing/2010/main" w="9525">
                   <a:solidFill>
                     <a:srgbClr val="000000"/>
                   </a:solidFill>
@@ -25324,7 +25156,7 @@
             </a:ln>
             <a:extLst>
               <a:ext uri="{91240B29-F687-4f45-9708-019B960494DF}">
-                <a14:hiddenLine xmlns:a14="http://schemas.microsoft.com/office/drawing/2010/main" xmlns:mc="http://schemas.openxmlformats.org/markup-compatibility/2006" xmlns:p14="http://schemas.microsoft.com/office/powerpoint/2010/main" xmlns:a16="http://schemas.microsoft.com/office/drawing/2014/main" xmlns="" w="9525">
+                <a14:hiddenLine xmlns="" xmlns:a16="http://schemas.microsoft.com/office/drawing/2014/main" xmlns:p14="http://schemas.microsoft.com/office/powerpoint/2010/main" xmlns:mc="http://schemas.openxmlformats.org/markup-compatibility/2006" xmlns:a14="http://schemas.microsoft.com/office/drawing/2010/main" w="9525">
                   <a:solidFill>
                     <a:srgbClr val="000000"/>
                   </a:solidFill>
@@ -25429,7 +25261,7 @@
             </a:ln>
             <a:extLst>
               <a:ext uri="{91240B29-F687-4f45-9708-019B960494DF}">
-                <a14:hiddenLine xmlns:a14="http://schemas.microsoft.com/office/drawing/2010/main" xmlns:mc="http://schemas.openxmlformats.org/markup-compatibility/2006" xmlns:p14="http://schemas.microsoft.com/office/powerpoint/2010/main" xmlns:a16="http://schemas.microsoft.com/office/drawing/2014/main" xmlns="" w="9525">
+                <a14:hiddenLine xmlns="" xmlns:a16="http://schemas.microsoft.com/office/drawing/2014/main" xmlns:p14="http://schemas.microsoft.com/office/powerpoint/2010/main" xmlns:mc="http://schemas.openxmlformats.org/markup-compatibility/2006" xmlns:a14="http://schemas.microsoft.com/office/drawing/2010/main" w="9525">
                   <a:solidFill>
                     <a:srgbClr val="000000"/>
                   </a:solidFill>
@@ -25478,7 +25310,7 @@
             </a:ln>
             <a:extLst>
               <a:ext uri="{91240B29-F687-4f45-9708-019B960494DF}">
-                <a14:hiddenLine xmlns:a14="http://schemas.microsoft.com/office/drawing/2010/main" xmlns:mc="http://schemas.openxmlformats.org/markup-compatibility/2006" xmlns:p14="http://schemas.microsoft.com/office/powerpoint/2010/main" xmlns:a16="http://schemas.microsoft.com/office/drawing/2014/main" xmlns="" w="9525">
+                <a14:hiddenLine xmlns="" xmlns:a16="http://schemas.microsoft.com/office/drawing/2014/main" xmlns:p14="http://schemas.microsoft.com/office/powerpoint/2010/main" xmlns:mc="http://schemas.openxmlformats.org/markup-compatibility/2006" xmlns:a14="http://schemas.microsoft.com/office/drawing/2010/main" w="9525">
                   <a:solidFill>
                     <a:srgbClr val="000000"/>
                   </a:solidFill>
@@ -25934,7 +25766,7 @@
           <p:cNvPr id="2" name="Title 1">
             <a:extLst>
               <a:ext uri="{FF2B5EF4-FFF2-40B4-BE49-F238E27FC236}">
-                <a16:creationId xmlns:a16="http://schemas.microsoft.com/office/drawing/2014/main" id="{613D8FE7-2436-49A0-8275-EF75ADFA06AB}"/>
+                <a16:creationId xmlns:a16="http://schemas.microsoft.com/office/drawing/2014/main" id="{5FEC35EC-B61E-4144-B4A3-E8946DCDB7CA}"/>
               </a:ext>
             </a:extLst>
           </p:cNvPr>
@@ -25951,71 +25783,123 @@
           <a:lstStyle/>
           <a:p>
             <a:r>
-              <a:rPr lang="en-US" dirty="0"/>
-              <a:t>A few server </a:t>
-            </a:r>
-            <a:r>
               <a:rPr lang="en-US" dirty="0">
                 <a:solidFill>
                   <a:schemeClr val="accent2"/>
                 </a:solidFill>
               </a:rPr>
-              <a:t>use-case illustrations</a:t>
+              <a:t>Why </a:t>
+            </a:r>
+            <a:r>
+              <a:rPr lang="en-US" dirty="0"/>
+              <a:t>use a server?</a:t>
             </a:r>
           </a:p>
         </p:txBody>
       </p:sp>
-      <p:pic>
-        <p:nvPicPr>
-          <p:cNvPr id="1026" name="Picture 2" descr="https://upload.wikimedia.org/wikipedia/commons/thumb/f/fb/Server-based-network.svg/232px-Server-based-network.svg.png">
+      <p:sp>
+        <p:nvSpPr>
+          <p:cNvPr id="3" name="Content Placeholder 2">
             <a:extLst>
               <a:ext uri="{FF2B5EF4-FFF2-40B4-BE49-F238E27FC236}">
-                <a16:creationId xmlns:a16="http://schemas.microsoft.com/office/drawing/2014/main" id="{B90D281A-DA19-429E-82DC-17BCC45DF3A1}"/>
+                <a16:creationId xmlns:a16="http://schemas.microsoft.com/office/drawing/2014/main" id="{E167FAB0-F0F3-4550-80B6-5BADC3EE0EFC}"/>
               </a:ext>
             </a:extLst>
           </p:cNvPr>
-          <p:cNvPicPr>
-            <a:picLocks noChangeAspect="1" noChangeArrowheads="1"/>
-          </p:cNvPicPr>
-          <p:nvPr/>
-        </p:nvPicPr>
-        <p:blipFill>
-          <a:blip r:embed="rId2">
-            <a:extLst>
-              <a:ext uri="{28A0092B-C50C-407E-A947-70E740481C1C}">
-                <a14:useLocalDpi xmlns:a14="http://schemas.microsoft.com/office/drawing/2010/main" val="0"/>
-              </a:ext>
-            </a:extLst>
-          </a:blip>
-          <a:srcRect/>
-          <a:stretch>
-            <a:fillRect/>
-          </a:stretch>
-        </p:blipFill>
-        <p:spPr bwMode="auto">
+          <p:cNvSpPr>
+            <a:spLocks noGrp="1"/>
+          </p:cNvSpPr>
+          <p:nvPr>
+            <p:ph idx="1"/>
+          </p:nvPr>
+        </p:nvSpPr>
+        <p:spPr>
           <a:xfrm>
-            <a:off x="482895" y="1560968"/>
-            <a:ext cx="5120463" cy="5297031"/>
+            <a:off x="1141412" y="2249486"/>
+            <a:ext cx="9905999" cy="4076885"/>
           </a:xfrm>
-          <a:prstGeom prst="rect">
-            <a:avLst/>
-          </a:prstGeom>
-          <a:noFill/>
-          <a:extLst>
-            <a:ext uri="{909E8E84-426E-40DD-AFC4-6F175D3DCCD1}">
-              <a14:hiddenFill xmlns:a14="http://schemas.microsoft.com/office/drawing/2010/main">
-                <a:solidFill>
-                  <a:srgbClr val="FFFFFF"/>
-                </a:solidFill>
-              </a14:hiddenFill>
-            </a:ext>
-          </a:extLst>
         </p:spPr>
-      </p:pic>
+        <p:txBody>
+          <a:bodyPr>
+            <a:normAutofit/>
+          </a:bodyPr>
+          <a:lstStyle/>
+          <a:p>
+            <a:r>
+              <a:rPr lang="en-US" dirty="0"/>
+              <a:t>Servers often have more memory and less overhead</a:t>
+            </a:r>
+          </a:p>
+          <a:p>
+            <a:pPr lvl="1"/>
+            <a:r>
+              <a:rPr lang="en-US" dirty="0"/>
+              <a:t>They don’t have to think about whether you’re about to start Pandora or play Candy Crush or open 32 Chrome tabs</a:t>
+            </a:r>
+          </a:p>
+          <a:p>
+            <a:r>
+              <a:rPr lang="en-US" dirty="0"/>
+              <a:t>Great for big data sets</a:t>
+            </a:r>
+          </a:p>
+          <a:p>
+            <a:pPr lvl="1"/>
+            <a:r>
+              <a:rPr lang="en-US" dirty="0"/>
+              <a:t>Databases</a:t>
+            </a:r>
+          </a:p>
+          <a:p>
+            <a:pPr lvl="1"/>
+            <a:r>
+              <a:rPr lang="en-US" dirty="0"/>
+              <a:t>Textual analysis (</a:t>
+            </a:r>
+            <a:r>
+              <a:rPr lang="en-US" dirty="0" err="1"/>
+              <a:t>Voyant</a:t>
+            </a:r>
+            <a:r>
+              <a:rPr lang="en-US" dirty="0"/>
+              <a:t>-Tools, </a:t>
+            </a:r>
+            <a:r>
+              <a:rPr lang="en-US" dirty="0" err="1"/>
+              <a:t>HathiTrust</a:t>
+            </a:r>
+            <a:r>
+              <a:rPr lang="en-US" dirty="0"/>
+              <a:t>, SOTU-</a:t>
+            </a:r>
+            <a:r>
+              <a:rPr lang="en-US" dirty="0" err="1"/>
+              <a:t>db</a:t>
+            </a:r>
+            <a:r>
+              <a:rPr lang="en-US" dirty="0"/>
+              <a:t> 😎)</a:t>
+            </a:r>
+          </a:p>
+          <a:p>
+            <a:r>
+              <a:rPr lang="en-US" dirty="0"/>
+              <a:t>Full control</a:t>
+            </a:r>
+          </a:p>
+          <a:p>
+            <a:pPr lvl="1"/>
+            <a:r>
+              <a:rPr lang="en-US" dirty="0"/>
+              <a:t>A great environment for learning HTML/CSS </a:t>
+            </a:r>
+          </a:p>
+        </p:txBody>
+      </p:sp>
     </p:spTree>
     <p:extLst>
       <p:ext uri="{BB962C8B-B14F-4D97-AF65-F5344CB8AC3E}">
-        <p14:creationId xmlns:p14="http://schemas.microsoft.com/office/powerpoint/2010/main" val="147607126"/>
+        <p14:creationId xmlns:p14="http://schemas.microsoft.com/office/powerpoint/2010/main" val="670784547"/>
       </p:ext>
     </p:extLst>
   </p:cSld>

</xml_diff>